<commit_message>
Präsentation Nationale Kohorte ist fertig
Hab die Präsentation fertig gemacht. Sind genau 22 Folien geworden.
Inklusive diverser Titelfolien. Ich dachte das würde mehr werden. Aber
inhaltlich gibt es nichts, was ich noch erwähnenswert finde. Das was man
noch labern könnte, interessiert doch keinen. Oder ist die
Entstehungsgeschichte interessant? Ich finde nicht.
</commit_message>
<xml_diff>
--- a/NationaleKohorte/NationaleKohortePraes.pptx
+++ b/NationaleKohorte/NationaleKohortePraes.pptx
@@ -5,7 +5,7 @@
     <p:sldMasterId id="2147483685" r:id="rId1"/>
   </p:sldMasterIdLst>
   <p:notesMasterIdLst>
-    <p:notesMasterId r:id="rId10"/>
+    <p:notesMasterId r:id="rId25"/>
   </p:notesMasterIdLst>
   <p:sldIdLst>
     <p:sldId id="279" r:id="rId2"/>
@@ -16,6 +16,21 @@
     <p:sldId id="284" r:id="rId7"/>
     <p:sldId id="285" r:id="rId8"/>
     <p:sldId id="286" r:id="rId9"/>
+    <p:sldId id="287" r:id="rId10"/>
+    <p:sldId id="288" r:id="rId11"/>
+    <p:sldId id="289" r:id="rId12"/>
+    <p:sldId id="290" r:id="rId13"/>
+    <p:sldId id="291" r:id="rId14"/>
+    <p:sldId id="292" r:id="rId15"/>
+    <p:sldId id="293" r:id="rId16"/>
+    <p:sldId id="294" r:id="rId17"/>
+    <p:sldId id="295" r:id="rId18"/>
+    <p:sldId id="296" r:id="rId19"/>
+    <p:sldId id="297" r:id="rId20"/>
+    <p:sldId id="298" r:id="rId21"/>
+    <p:sldId id="299" r:id="rId22"/>
+    <p:sldId id="300" r:id="rId23"/>
+    <p:sldId id="301" r:id="rId24"/>
   </p:sldIdLst>
   <p:sldSz cx="12192000" cy="6858000"/>
   <p:notesSz cx="6858000" cy="9144000"/>
@@ -210,7 +225,7 @@
           <a:p>
             <a:fld id="{FD0E5214-A780-45B3-8C91-E131831524A4}" type="datetimeFigureOut">
               <a:rPr lang="de-DE" smtClean="0"/>
-              <a:t>28.03.2015</a:t>
+              <a:t>29.03.2015</a:t>
             </a:fld>
             <a:endParaRPr lang="de-DE"/>
           </a:p>
@@ -522,31 +537,43 @@
           <a:bodyPr/>
           <a:lstStyle/>
           <a:p>
+            <a:pPr marL="0" marR="0" indent="0" algn="l" defTabSz="914400" rtl="0" eaLnBrk="1" fontAlgn="auto" latinLnBrk="0" hangingPunct="1">
+              <a:lnSpc>
+                <a:spcPct val="100000"/>
+              </a:lnSpc>
+              <a:spcBef>
+                <a:spcPts val="0"/>
+              </a:spcBef>
+              <a:spcAft>
+                <a:spcPts val="0"/>
+              </a:spcAft>
+              <a:buClrTx/>
+              <a:buSzTx/>
+              <a:buFontTx/>
+              <a:buNone/>
+              <a:tabLst/>
+              <a:defRPr/>
+            </a:pPr>
             <a:r>
               <a:rPr lang="de-DE" dirty="0" smtClean="0"/>
-              <a:t>Helmholtz: deutsche Gesellschaft</a:t>
+              <a:t>Volkskrankheiten:</a:t>
             </a:r>
             <a:r>
               <a:rPr lang="de-DE" baseline="0" dirty="0" smtClean="0"/>
-              <a:t> zur Förderung und Finanzierung der Forschung</a:t>
-            </a:r>
-          </a:p>
-          <a:p>
-            <a:r>
-              <a:rPr lang="de-DE" baseline="0" dirty="0" smtClean="0"/>
-              <a:t>Uni Bsp.: Charité Berlin, Uniklinikum Freiburg, Uni HD</a:t>
-            </a:r>
-          </a:p>
-          <a:p>
-            <a:r>
-              <a:rPr lang="de-DE" baseline="0" dirty="0" smtClean="0"/>
-              <a:t>Leibniz: Zusammenschluss deutscher Forschungsinstitute unterschiedlicher </a:t>
-            </a:r>
-            <a:r>
-              <a:rPr lang="de-DE" baseline="0" dirty="0" err="1" smtClean="0"/>
-              <a:t>Fachrichtunge</a:t>
-            </a:r>
-            <a:endParaRPr lang="de-DE" baseline="0" dirty="0" smtClean="0"/>
+              <a:t> z.B. </a:t>
+            </a:r>
+            <a:r>
+              <a:rPr lang="de-DE" sz="1200" kern="1200" dirty="0" smtClean="0">
+                <a:solidFill>
+                  <a:schemeClr val="tx1"/>
+                </a:solidFill>
+                <a:effectLst/>
+                <a:latin typeface="+mn-lt"/>
+                <a:ea typeface="+mn-ea"/>
+                <a:cs typeface="+mn-cs"/>
+              </a:rPr>
+              <a:t>Diabetes, Demenz, Herz-Kreislauf-Erkrankungen und Krebs.</a:t>
+            </a:r>
           </a:p>
           <a:p>
             <a:endParaRPr lang="de-DE" dirty="0"/>
@@ -570,7 +597,7 @@
           <a:p>
             <a:fld id="{291A2AE1-9A89-46FB-B262-609F9F6D1590}" type="slidenum">
               <a:rPr lang="de-DE" smtClean="0"/>
-              <a:t>6</a:t>
+              <a:t>4</a:t>
             </a:fld>
             <a:endParaRPr lang="de-DE"/>
           </a:p>
@@ -579,7 +606,457 @@
     </p:spTree>
     <p:extLst>
       <p:ext uri="{BB962C8B-B14F-4D97-AF65-F5344CB8AC3E}">
-        <p14:creationId xmlns:p14="http://schemas.microsoft.com/office/powerpoint/2010/main" val="2849412613"/>
+        <p14:creationId xmlns:p14="http://schemas.microsoft.com/office/powerpoint/2010/main" val="903872789"/>
+      </p:ext>
+    </p:extLst>
+  </p:cSld>
+  <p:clrMapOvr>
+    <a:masterClrMapping/>
+  </p:clrMapOvr>
+</p:notes>
+</file>
+
+<file path=ppt/notesSlides/notesSlide10.xml><?xml version="1.0" encoding="utf-8"?>
+<p:notes xmlns:a="http://schemas.openxmlformats.org/drawingml/2006/main" xmlns:r="http://schemas.openxmlformats.org/officeDocument/2006/relationships" xmlns:p="http://schemas.openxmlformats.org/presentationml/2006/main">
+  <p:cSld>
+    <p:spTree>
+      <p:nvGrpSpPr>
+        <p:cNvPr id="1" name=""/>
+        <p:cNvGrpSpPr/>
+        <p:nvPr/>
+      </p:nvGrpSpPr>
+      <p:grpSpPr>
+        <a:xfrm>
+          <a:off x="0" y="0"/>
+          <a:ext cx="0" cy="0"/>
+          <a:chOff x="0" y="0"/>
+          <a:chExt cx="0" cy="0"/>
+        </a:xfrm>
+      </p:grpSpPr>
+      <p:sp>
+        <p:nvSpPr>
+          <p:cNvPr id="2" name="Folienbildplatzhalter 1"/>
+          <p:cNvSpPr>
+            <a:spLocks noGrp="1" noRot="1" noChangeAspect="1"/>
+          </p:cNvSpPr>
+          <p:nvPr>
+            <p:ph type="sldImg"/>
+          </p:nvPr>
+        </p:nvSpPr>
+        <p:spPr/>
+      </p:sp>
+      <p:sp>
+        <p:nvSpPr>
+          <p:cNvPr id="3" name="Notizenplatzhalter 2"/>
+          <p:cNvSpPr>
+            <a:spLocks noGrp="1"/>
+          </p:cNvSpPr>
+          <p:nvPr>
+            <p:ph type="body" idx="1"/>
+          </p:nvPr>
+        </p:nvSpPr>
+        <p:spPr/>
+        <p:txBody>
+          <a:bodyPr/>
+          <a:lstStyle/>
+          <a:p>
+            <a:r>
+              <a:rPr lang="de-DE" dirty="0" smtClean="0"/>
+              <a:t>Freiwillig: Einwilligungserklärung</a:t>
+            </a:r>
+          </a:p>
+          <a:p>
+            <a:r>
+              <a:rPr lang="de-DE" baseline="0" dirty="0" smtClean="0"/>
+              <a:t>Widerruf ohne Angabe von Gründen </a:t>
+            </a:r>
+          </a:p>
+          <a:p>
+            <a:endParaRPr lang="de-DE" dirty="0"/>
+          </a:p>
+        </p:txBody>
+      </p:sp>
+      <p:sp>
+        <p:nvSpPr>
+          <p:cNvPr id="4" name="Foliennummernplatzhalter 3"/>
+          <p:cNvSpPr>
+            <a:spLocks noGrp="1"/>
+          </p:cNvSpPr>
+          <p:nvPr>
+            <p:ph type="sldNum" sz="quarter" idx="10"/>
+          </p:nvPr>
+        </p:nvSpPr>
+        <p:spPr/>
+        <p:txBody>
+          <a:bodyPr/>
+          <a:lstStyle/>
+          <a:p>
+            <a:fld id="{291A2AE1-9A89-46FB-B262-609F9F6D1590}" type="slidenum">
+              <a:rPr lang="de-DE" smtClean="0"/>
+              <a:t>18</a:t>
+            </a:fld>
+            <a:endParaRPr lang="de-DE"/>
+          </a:p>
+        </p:txBody>
+      </p:sp>
+    </p:spTree>
+    <p:extLst>
+      <p:ext uri="{BB962C8B-B14F-4D97-AF65-F5344CB8AC3E}">
+        <p14:creationId xmlns:p14="http://schemas.microsoft.com/office/powerpoint/2010/main" val="408670673"/>
+      </p:ext>
+    </p:extLst>
+  </p:cSld>
+  <p:clrMapOvr>
+    <a:masterClrMapping/>
+  </p:clrMapOvr>
+</p:notes>
+</file>
+
+<file path=ppt/notesSlides/notesSlide11.xml><?xml version="1.0" encoding="utf-8"?>
+<p:notes xmlns:a="http://schemas.openxmlformats.org/drawingml/2006/main" xmlns:r="http://schemas.openxmlformats.org/officeDocument/2006/relationships" xmlns:p="http://schemas.openxmlformats.org/presentationml/2006/main">
+  <p:cSld>
+    <p:spTree>
+      <p:nvGrpSpPr>
+        <p:cNvPr id="1" name=""/>
+        <p:cNvGrpSpPr/>
+        <p:nvPr/>
+      </p:nvGrpSpPr>
+      <p:grpSpPr>
+        <a:xfrm>
+          <a:off x="0" y="0"/>
+          <a:ext cx="0" cy="0"/>
+          <a:chOff x="0" y="0"/>
+          <a:chExt cx="0" cy="0"/>
+        </a:xfrm>
+      </p:grpSpPr>
+      <p:sp>
+        <p:nvSpPr>
+          <p:cNvPr id="2" name="Folienbildplatzhalter 1"/>
+          <p:cNvSpPr>
+            <a:spLocks noGrp="1" noRot="1" noChangeAspect="1"/>
+          </p:cNvSpPr>
+          <p:nvPr>
+            <p:ph type="sldImg"/>
+          </p:nvPr>
+        </p:nvSpPr>
+        <p:spPr/>
+      </p:sp>
+      <p:sp>
+        <p:nvSpPr>
+          <p:cNvPr id="3" name="Notizenplatzhalter 2"/>
+          <p:cNvSpPr>
+            <a:spLocks noGrp="1"/>
+          </p:cNvSpPr>
+          <p:nvPr>
+            <p:ph type="body" idx="1"/>
+          </p:nvPr>
+        </p:nvSpPr>
+        <p:spPr/>
+        <p:txBody>
+          <a:bodyPr/>
+          <a:lstStyle/>
+          <a:p>
+            <a:r>
+              <a:rPr lang="de-DE" dirty="0" smtClean="0"/>
+              <a:t>26-seitiger Ethik-Kodex</a:t>
+            </a:r>
+            <a:r>
+              <a:rPr lang="de-DE" baseline="0" dirty="0" smtClean="0"/>
+              <a:t> im I-Net</a:t>
+            </a:r>
+            <a:endParaRPr lang="de-DE" dirty="0"/>
+          </a:p>
+        </p:txBody>
+      </p:sp>
+      <p:sp>
+        <p:nvSpPr>
+          <p:cNvPr id="4" name="Foliennummernplatzhalter 3"/>
+          <p:cNvSpPr>
+            <a:spLocks noGrp="1"/>
+          </p:cNvSpPr>
+          <p:nvPr>
+            <p:ph type="sldNum" sz="quarter" idx="10"/>
+          </p:nvPr>
+        </p:nvSpPr>
+        <p:spPr/>
+        <p:txBody>
+          <a:bodyPr/>
+          <a:lstStyle/>
+          <a:p>
+            <a:fld id="{291A2AE1-9A89-46FB-B262-609F9F6D1590}" type="slidenum">
+              <a:rPr lang="de-DE" smtClean="0"/>
+              <a:t>20</a:t>
+            </a:fld>
+            <a:endParaRPr lang="de-DE"/>
+          </a:p>
+        </p:txBody>
+      </p:sp>
+    </p:spTree>
+    <p:extLst>
+      <p:ext uri="{BB962C8B-B14F-4D97-AF65-F5344CB8AC3E}">
+        <p14:creationId xmlns:p14="http://schemas.microsoft.com/office/powerpoint/2010/main" val="3487112392"/>
+      </p:ext>
+    </p:extLst>
+  </p:cSld>
+  <p:clrMapOvr>
+    <a:masterClrMapping/>
+  </p:clrMapOvr>
+</p:notes>
+</file>
+
+<file path=ppt/notesSlides/notesSlide12.xml><?xml version="1.0" encoding="utf-8"?>
+<p:notes xmlns:a="http://schemas.openxmlformats.org/drawingml/2006/main" xmlns:r="http://schemas.openxmlformats.org/officeDocument/2006/relationships" xmlns:p="http://schemas.openxmlformats.org/presentationml/2006/main">
+  <p:cSld>
+    <p:spTree>
+      <p:nvGrpSpPr>
+        <p:cNvPr id="1" name=""/>
+        <p:cNvGrpSpPr/>
+        <p:nvPr/>
+      </p:nvGrpSpPr>
+      <p:grpSpPr>
+        <a:xfrm>
+          <a:off x="0" y="0"/>
+          <a:ext cx="0" cy="0"/>
+          <a:chOff x="0" y="0"/>
+          <a:chExt cx="0" cy="0"/>
+        </a:xfrm>
+      </p:grpSpPr>
+      <p:sp>
+        <p:nvSpPr>
+          <p:cNvPr id="2" name="Folienbildplatzhalter 1"/>
+          <p:cNvSpPr>
+            <a:spLocks noGrp="1" noRot="1" noChangeAspect="1"/>
+          </p:cNvSpPr>
+          <p:nvPr>
+            <p:ph type="sldImg"/>
+          </p:nvPr>
+        </p:nvSpPr>
+        <p:spPr/>
+      </p:sp>
+      <p:sp>
+        <p:nvSpPr>
+          <p:cNvPr id="3" name="Notizenplatzhalter 2"/>
+          <p:cNvSpPr>
+            <a:spLocks noGrp="1"/>
+          </p:cNvSpPr>
+          <p:nvPr>
+            <p:ph type="body" idx="1"/>
+          </p:nvPr>
+        </p:nvSpPr>
+        <p:spPr/>
+        <p:txBody>
+          <a:bodyPr/>
+          <a:lstStyle/>
+          <a:p>
+            <a:r>
+              <a:rPr lang="de-DE" dirty="0" smtClean="0"/>
+              <a:t>Datenverwendung: </a:t>
+            </a:r>
+            <a:r>
+              <a:rPr lang="de-DE" sz="1200" kern="1200" dirty="0" smtClean="0">
+                <a:solidFill>
+                  <a:schemeClr val="tx1"/>
+                </a:solidFill>
+                <a:effectLst/>
+                <a:latin typeface="+mn-lt"/>
+                <a:ea typeface="+mn-ea"/>
+                <a:cs typeface="+mn-cs"/>
+              </a:rPr>
+              <a:t>stehen auf Antrag (</a:t>
+            </a:r>
+            <a:r>
+              <a:rPr lang="de-DE" sz="1200" kern="1200" dirty="0" err="1" smtClean="0">
+                <a:solidFill>
+                  <a:schemeClr val="tx1"/>
+                </a:solidFill>
+                <a:effectLst/>
+                <a:latin typeface="+mn-lt"/>
+                <a:ea typeface="+mn-ea"/>
+                <a:cs typeface="+mn-cs"/>
+              </a:rPr>
+              <a:t>inter</a:t>
+            </a:r>
+            <a:r>
+              <a:rPr lang="de-DE" sz="1200" kern="1200" dirty="0" smtClean="0">
+                <a:solidFill>
+                  <a:schemeClr val="tx1"/>
+                </a:solidFill>
+                <a:effectLst/>
+                <a:latin typeface="+mn-lt"/>
+                <a:ea typeface="+mn-ea"/>
+                <a:cs typeface="+mn-cs"/>
+              </a:rPr>
+              <a:t>)nationalen Wissenschaftlern für wissenschaftliche Forschung zur Verfügung, hierbei muss eine 13-seitige Nutzungsordnung beachtet werden</a:t>
+            </a:r>
+          </a:p>
+          <a:p>
+            <a:r>
+              <a:rPr lang="de-DE" sz="1200" kern="1200" dirty="0" smtClean="0">
+                <a:solidFill>
+                  <a:schemeClr val="tx1"/>
+                </a:solidFill>
+                <a:effectLst/>
+                <a:latin typeface="+mn-lt"/>
+                <a:ea typeface="+mn-ea"/>
+                <a:cs typeface="+mn-cs"/>
+              </a:rPr>
+              <a:t>Abstimmung mit Bundesdatenschutzbeauftragten und zuständiger Ethikkommission</a:t>
+            </a:r>
+          </a:p>
+          <a:p>
+            <a:r>
+              <a:rPr lang="de-DE" sz="1200" kern="1200" dirty="0" smtClean="0">
+                <a:solidFill>
+                  <a:schemeClr val="tx1"/>
+                </a:solidFill>
+                <a:effectLst/>
+                <a:latin typeface="+mn-lt"/>
+                <a:ea typeface="+mn-ea"/>
+                <a:cs typeface="+mn-cs"/>
+              </a:rPr>
+              <a:t>90-seitiges Datenschutz- und IT-Sicherheitskonzept der NAKO</a:t>
+            </a:r>
+          </a:p>
+          <a:p>
+            <a:r>
+              <a:rPr lang="de-DE" sz="1200" kern="1200" dirty="0" smtClean="0">
+                <a:solidFill>
+                  <a:schemeClr val="tx1"/>
+                </a:solidFill>
+                <a:effectLst/>
+                <a:latin typeface="+mn-lt"/>
+                <a:ea typeface="+mn-ea"/>
+                <a:cs typeface="+mn-cs"/>
+              </a:rPr>
+              <a:t>43-seitiges Datenschutz- und IT-Sicherheitskonzept der unabhängigen Treuhandstelle der NAKO</a:t>
+            </a:r>
+            <a:endParaRPr lang="de-DE" dirty="0"/>
+          </a:p>
+        </p:txBody>
+      </p:sp>
+      <p:sp>
+        <p:nvSpPr>
+          <p:cNvPr id="4" name="Foliennummernplatzhalter 3"/>
+          <p:cNvSpPr>
+            <a:spLocks noGrp="1"/>
+          </p:cNvSpPr>
+          <p:nvPr>
+            <p:ph type="sldNum" sz="quarter" idx="10"/>
+          </p:nvPr>
+        </p:nvSpPr>
+        <p:spPr/>
+        <p:txBody>
+          <a:bodyPr/>
+          <a:lstStyle/>
+          <a:p>
+            <a:fld id="{291A2AE1-9A89-46FB-B262-609F9F6D1590}" type="slidenum">
+              <a:rPr lang="de-DE" smtClean="0"/>
+              <a:t>21</a:t>
+            </a:fld>
+            <a:endParaRPr lang="de-DE"/>
+          </a:p>
+        </p:txBody>
+      </p:sp>
+    </p:spTree>
+    <p:extLst>
+      <p:ext uri="{BB962C8B-B14F-4D97-AF65-F5344CB8AC3E}">
+        <p14:creationId xmlns:p14="http://schemas.microsoft.com/office/powerpoint/2010/main" val="744977189"/>
+      </p:ext>
+    </p:extLst>
+  </p:cSld>
+  <p:clrMapOvr>
+    <a:masterClrMapping/>
+  </p:clrMapOvr>
+</p:notes>
+</file>
+
+<file path=ppt/notesSlides/notesSlide13.xml><?xml version="1.0" encoding="utf-8"?>
+<p:notes xmlns:a="http://schemas.openxmlformats.org/drawingml/2006/main" xmlns:r="http://schemas.openxmlformats.org/officeDocument/2006/relationships" xmlns:p="http://schemas.openxmlformats.org/presentationml/2006/main">
+  <p:cSld>
+    <p:spTree>
+      <p:nvGrpSpPr>
+        <p:cNvPr id="1" name=""/>
+        <p:cNvGrpSpPr/>
+        <p:nvPr/>
+      </p:nvGrpSpPr>
+      <p:grpSpPr>
+        <a:xfrm>
+          <a:off x="0" y="0"/>
+          <a:ext cx="0" cy="0"/>
+          <a:chOff x="0" y="0"/>
+          <a:chExt cx="0" cy="0"/>
+        </a:xfrm>
+      </p:grpSpPr>
+      <p:sp>
+        <p:nvSpPr>
+          <p:cNvPr id="2" name="Folienbildplatzhalter 1"/>
+          <p:cNvSpPr>
+            <a:spLocks noGrp="1" noRot="1" noChangeAspect="1"/>
+          </p:cNvSpPr>
+          <p:nvPr>
+            <p:ph type="sldImg"/>
+          </p:nvPr>
+        </p:nvSpPr>
+        <p:spPr/>
+      </p:sp>
+      <p:sp>
+        <p:nvSpPr>
+          <p:cNvPr id="3" name="Notizenplatzhalter 2"/>
+          <p:cNvSpPr>
+            <a:spLocks noGrp="1"/>
+          </p:cNvSpPr>
+          <p:nvPr>
+            <p:ph type="body" idx="1"/>
+          </p:nvPr>
+        </p:nvSpPr>
+        <p:spPr/>
+        <p:txBody>
+          <a:bodyPr/>
+          <a:lstStyle/>
+          <a:p>
+            <a:r>
+              <a:rPr lang="de-DE" sz="1200" kern="1200" dirty="0" smtClean="0">
+                <a:solidFill>
+                  <a:schemeClr val="tx1"/>
+                </a:solidFill>
+                <a:effectLst/>
+                <a:latin typeface="+mn-lt"/>
+                <a:ea typeface="+mn-ea"/>
+                <a:cs typeface="+mn-cs"/>
+              </a:rPr>
+              <a:t>Zum Wohl der TN und um vergleichbare und damit statistisch verwertbare Daten zu erhalten</a:t>
+            </a:r>
+            <a:endParaRPr lang="de-DE" dirty="0"/>
+          </a:p>
+        </p:txBody>
+      </p:sp>
+      <p:sp>
+        <p:nvSpPr>
+          <p:cNvPr id="4" name="Foliennummernplatzhalter 3"/>
+          <p:cNvSpPr>
+            <a:spLocks noGrp="1"/>
+          </p:cNvSpPr>
+          <p:nvPr>
+            <p:ph type="sldNum" sz="quarter" idx="10"/>
+          </p:nvPr>
+        </p:nvSpPr>
+        <p:spPr/>
+        <p:txBody>
+          <a:bodyPr/>
+          <a:lstStyle/>
+          <a:p>
+            <a:fld id="{291A2AE1-9A89-46FB-B262-609F9F6D1590}" type="slidenum">
+              <a:rPr lang="de-DE" smtClean="0"/>
+              <a:t>22</a:t>
+            </a:fld>
+            <a:endParaRPr lang="de-DE"/>
+          </a:p>
+        </p:txBody>
+      </p:sp>
+    </p:spTree>
+    <p:extLst>
+      <p:ext uri="{BB962C8B-B14F-4D97-AF65-F5344CB8AC3E}">
+        <p14:creationId xmlns:p14="http://schemas.microsoft.com/office/powerpoint/2010/main" val="3490045610"/>
       </p:ext>
     </p:extLst>
   </p:cSld>
@@ -635,12 +1112,31 @@
           <a:p>
             <a:r>
               <a:rPr lang="de-DE" dirty="0" smtClean="0"/>
-              <a:t>Nicht beteiligte Bundesländer</a:t>
+              <a:t>Helmholtz: deutsche Gesellschaft</a:t>
             </a:r>
             <a:r>
               <a:rPr lang="de-DE" baseline="0" dirty="0" smtClean="0"/>
-              <a:t>: RLP, Thüringen</a:t>
-            </a:r>
+              <a:t> zur Förderung und Finanzierung der Forschung</a:t>
+            </a:r>
+          </a:p>
+          <a:p>
+            <a:r>
+              <a:rPr lang="de-DE" baseline="0" dirty="0" smtClean="0"/>
+              <a:t>Uni Bsp.: Charité Berlin, Uniklinikum Freiburg, Uni HD</a:t>
+            </a:r>
+          </a:p>
+          <a:p>
+            <a:r>
+              <a:rPr lang="de-DE" baseline="0" dirty="0" smtClean="0"/>
+              <a:t>Leibniz: Zusammenschluss deutscher Forschungsinstitute unterschiedlicher </a:t>
+            </a:r>
+            <a:r>
+              <a:rPr lang="de-DE" baseline="0" dirty="0" err="1" smtClean="0"/>
+              <a:t>Fachrichtunge</a:t>
+            </a:r>
+            <a:endParaRPr lang="de-DE" baseline="0" dirty="0" smtClean="0"/>
+          </a:p>
+          <a:p>
             <a:endParaRPr lang="de-DE" dirty="0"/>
           </a:p>
         </p:txBody>
@@ -662,7 +1158,7 @@
           <a:p>
             <a:fld id="{291A2AE1-9A89-46FB-B262-609F9F6D1590}" type="slidenum">
               <a:rPr lang="de-DE" smtClean="0"/>
-              <a:t>7</a:t>
+              <a:t>6</a:t>
             </a:fld>
             <a:endParaRPr lang="de-DE"/>
           </a:p>
@@ -671,7 +1167,7 @@
     </p:spTree>
     <p:extLst>
       <p:ext uri="{BB962C8B-B14F-4D97-AF65-F5344CB8AC3E}">
-        <p14:creationId xmlns:p14="http://schemas.microsoft.com/office/powerpoint/2010/main" val="3444590127"/>
+        <p14:creationId xmlns:p14="http://schemas.microsoft.com/office/powerpoint/2010/main" val="2849412613"/>
       </p:ext>
     </p:extLst>
   </p:cSld>
@@ -727,6 +1223,98 @@
           <a:p>
             <a:r>
               <a:rPr lang="de-DE" dirty="0" smtClean="0"/>
+              <a:t>Nicht beteiligte Bundesländer</a:t>
+            </a:r>
+            <a:r>
+              <a:rPr lang="de-DE" baseline="0" dirty="0" smtClean="0"/>
+              <a:t>: RLP, Thüringen</a:t>
+            </a:r>
+            <a:endParaRPr lang="de-DE" dirty="0"/>
+          </a:p>
+        </p:txBody>
+      </p:sp>
+      <p:sp>
+        <p:nvSpPr>
+          <p:cNvPr id="4" name="Foliennummernplatzhalter 3"/>
+          <p:cNvSpPr>
+            <a:spLocks noGrp="1"/>
+          </p:cNvSpPr>
+          <p:nvPr>
+            <p:ph type="sldNum" sz="quarter" idx="10"/>
+          </p:nvPr>
+        </p:nvSpPr>
+        <p:spPr/>
+        <p:txBody>
+          <a:bodyPr/>
+          <a:lstStyle/>
+          <a:p>
+            <a:fld id="{291A2AE1-9A89-46FB-B262-609F9F6D1590}" type="slidenum">
+              <a:rPr lang="de-DE" smtClean="0"/>
+              <a:t>7</a:t>
+            </a:fld>
+            <a:endParaRPr lang="de-DE"/>
+          </a:p>
+        </p:txBody>
+      </p:sp>
+    </p:spTree>
+    <p:extLst>
+      <p:ext uri="{BB962C8B-B14F-4D97-AF65-F5344CB8AC3E}">
+        <p14:creationId xmlns:p14="http://schemas.microsoft.com/office/powerpoint/2010/main" val="3444590127"/>
+      </p:ext>
+    </p:extLst>
+  </p:cSld>
+  <p:clrMapOvr>
+    <a:masterClrMapping/>
+  </p:clrMapOvr>
+</p:notes>
+</file>
+
+<file path=ppt/notesSlides/notesSlide4.xml><?xml version="1.0" encoding="utf-8"?>
+<p:notes xmlns:a="http://schemas.openxmlformats.org/drawingml/2006/main" xmlns:r="http://schemas.openxmlformats.org/officeDocument/2006/relationships" xmlns:p="http://schemas.openxmlformats.org/presentationml/2006/main">
+  <p:cSld>
+    <p:spTree>
+      <p:nvGrpSpPr>
+        <p:cNvPr id="1" name=""/>
+        <p:cNvGrpSpPr/>
+        <p:nvPr/>
+      </p:nvGrpSpPr>
+      <p:grpSpPr>
+        <a:xfrm>
+          <a:off x="0" y="0"/>
+          <a:ext cx="0" cy="0"/>
+          <a:chOff x="0" y="0"/>
+          <a:chExt cx="0" cy="0"/>
+        </a:xfrm>
+      </p:grpSpPr>
+      <p:sp>
+        <p:nvSpPr>
+          <p:cNvPr id="2" name="Folienbildplatzhalter 1"/>
+          <p:cNvSpPr>
+            <a:spLocks noGrp="1" noRot="1" noChangeAspect="1"/>
+          </p:cNvSpPr>
+          <p:nvPr>
+            <p:ph type="sldImg"/>
+          </p:nvPr>
+        </p:nvSpPr>
+        <p:spPr/>
+      </p:sp>
+      <p:sp>
+        <p:nvSpPr>
+          <p:cNvPr id="3" name="Notizenplatzhalter 2"/>
+          <p:cNvSpPr>
+            <a:spLocks noGrp="1"/>
+          </p:cNvSpPr>
+          <p:nvPr>
+            <p:ph type="body" idx="1"/>
+          </p:nvPr>
+        </p:nvSpPr>
+        <p:spPr/>
+        <p:txBody>
+          <a:bodyPr/>
+          <a:lstStyle/>
+          <a:p>
+            <a:r>
+              <a:rPr lang="de-DE" dirty="0" smtClean="0"/>
               <a:t>Bio-Rep:</a:t>
             </a:r>
             <a:r>
@@ -926,6 +1514,937 @@
     <p:extLst>
       <p:ext uri="{BB962C8B-B14F-4D97-AF65-F5344CB8AC3E}">
         <p14:creationId xmlns:p14="http://schemas.microsoft.com/office/powerpoint/2010/main" val="685790575"/>
+      </p:ext>
+    </p:extLst>
+  </p:cSld>
+  <p:clrMapOvr>
+    <a:masterClrMapping/>
+  </p:clrMapOvr>
+</p:notes>
+</file>
+
+<file path=ppt/notesSlides/notesSlide5.xml><?xml version="1.0" encoding="utf-8"?>
+<p:notes xmlns:a="http://schemas.openxmlformats.org/drawingml/2006/main" xmlns:r="http://schemas.openxmlformats.org/officeDocument/2006/relationships" xmlns:p="http://schemas.openxmlformats.org/presentationml/2006/main">
+  <p:cSld>
+    <p:spTree>
+      <p:nvGrpSpPr>
+        <p:cNvPr id="1" name=""/>
+        <p:cNvGrpSpPr/>
+        <p:nvPr/>
+      </p:nvGrpSpPr>
+      <p:grpSpPr>
+        <a:xfrm>
+          <a:off x="0" y="0"/>
+          <a:ext cx="0" cy="0"/>
+          <a:chOff x="0" y="0"/>
+          <a:chExt cx="0" cy="0"/>
+        </a:xfrm>
+      </p:grpSpPr>
+      <p:sp>
+        <p:nvSpPr>
+          <p:cNvPr id="2" name="Folienbildplatzhalter 1"/>
+          <p:cNvSpPr>
+            <a:spLocks noGrp="1" noRot="1" noChangeAspect="1"/>
+          </p:cNvSpPr>
+          <p:nvPr>
+            <p:ph type="sldImg"/>
+          </p:nvPr>
+        </p:nvSpPr>
+        <p:spPr/>
+      </p:sp>
+      <p:sp>
+        <p:nvSpPr>
+          <p:cNvPr id="3" name="Notizenplatzhalter 2"/>
+          <p:cNvSpPr>
+            <a:spLocks noGrp="1"/>
+          </p:cNvSpPr>
+          <p:nvPr>
+            <p:ph type="body" idx="1"/>
+          </p:nvPr>
+        </p:nvSpPr>
+        <p:spPr/>
+        <p:txBody>
+          <a:bodyPr/>
+          <a:lstStyle/>
+          <a:p>
+            <a:r>
+              <a:rPr lang="de-DE" dirty="0" smtClean="0"/>
+              <a:t>Soziodemographisch: Zugehörigkeit zu einer bestimmten Gruppe (z. B. Alter, Einkommen, Geschlecht) betreffend</a:t>
+            </a:r>
+          </a:p>
+          <a:p>
+            <a:r>
+              <a:rPr lang="de-DE" dirty="0" smtClean="0"/>
+              <a:t>Sozioökonomisch: Wirtschaft in ihrer gesellschaftlichen Struktur betreffend</a:t>
+            </a:r>
+            <a:endParaRPr lang="de-DE" dirty="0"/>
+          </a:p>
+        </p:txBody>
+      </p:sp>
+      <p:sp>
+        <p:nvSpPr>
+          <p:cNvPr id="4" name="Foliennummernplatzhalter 3"/>
+          <p:cNvSpPr>
+            <a:spLocks noGrp="1"/>
+          </p:cNvSpPr>
+          <p:nvPr>
+            <p:ph type="sldNum" sz="quarter" idx="10"/>
+          </p:nvPr>
+        </p:nvSpPr>
+        <p:spPr/>
+        <p:txBody>
+          <a:bodyPr/>
+          <a:lstStyle/>
+          <a:p>
+            <a:fld id="{291A2AE1-9A89-46FB-B262-609F9F6D1590}" type="slidenum">
+              <a:rPr lang="de-DE" smtClean="0"/>
+              <a:t>10</a:t>
+            </a:fld>
+            <a:endParaRPr lang="de-DE"/>
+          </a:p>
+        </p:txBody>
+      </p:sp>
+    </p:spTree>
+    <p:extLst>
+      <p:ext uri="{BB962C8B-B14F-4D97-AF65-F5344CB8AC3E}">
+        <p14:creationId xmlns:p14="http://schemas.microsoft.com/office/powerpoint/2010/main" val="530106388"/>
+      </p:ext>
+    </p:extLst>
+  </p:cSld>
+  <p:clrMapOvr>
+    <a:masterClrMapping/>
+  </p:clrMapOvr>
+</p:notes>
+</file>
+
+<file path=ppt/notesSlides/notesSlide6.xml><?xml version="1.0" encoding="utf-8"?>
+<p:notes xmlns:a="http://schemas.openxmlformats.org/drawingml/2006/main" xmlns:r="http://schemas.openxmlformats.org/officeDocument/2006/relationships" xmlns:p="http://schemas.openxmlformats.org/presentationml/2006/main">
+  <p:cSld>
+    <p:spTree>
+      <p:nvGrpSpPr>
+        <p:cNvPr id="1" name=""/>
+        <p:cNvGrpSpPr/>
+        <p:nvPr/>
+      </p:nvGrpSpPr>
+      <p:grpSpPr>
+        <a:xfrm>
+          <a:off x="0" y="0"/>
+          <a:ext cx="0" cy="0"/>
+          <a:chOff x="0" y="0"/>
+          <a:chExt cx="0" cy="0"/>
+        </a:xfrm>
+      </p:grpSpPr>
+      <p:sp>
+        <p:nvSpPr>
+          <p:cNvPr id="2" name="Folienbildplatzhalter 1"/>
+          <p:cNvSpPr>
+            <a:spLocks noGrp="1" noRot="1" noChangeAspect="1"/>
+          </p:cNvSpPr>
+          <p:nvPr>
+            <p:ph type="sldImg"/>
+          </p:nvPr>
+        </p:nvSpPr>
+        <p:spPr/>
+      </p:sp>
+      <p:sp>
+        <p:nvSpPr>
+          <p:cNvPr id="3" name="Notizenplatzhalter 2"/>
+          <p:cNvSpPr>
+            <a:spLocks noGrp="1"/>
+          </p:cNvSpPr>
+          <p:nvPr>
+            <p:ph type="body" idx="1"/>
+          </p:nvPr>
+        </p:nvSpPr>
+        <p:spPr/>
+        <p:txBody>
+          <a:bodyPr/>
+          <a:lstStyle/>
+          <a:p>
+            <a:r>
+              <a:rPr lang="de-DE" dirty="0" smtClean="0"/>
+              <a:t>Prospektiv: vorausschauend</a:t>
+            </a:r>
+          </a:p>
+          <a:p>
+            <a:r>
+              <a:rPr lang="de-DE" dirty="0" smtClean="0"/>
+              <a:t>Kohorte:</a:t>
+            </a:r>
+            <a:r>
+              <a:rPr lang="de-DE" baseline="0" dirty="0" smtClean="0"/>
+              <a:t> Gruppe </a:t>
+            </a:r>
+            <a:r>
+              <a:rPr lang="de-DE" baseline="0" dirty="0" err="1" smtClean="0"/>
+              <a:t>od</a:t>
+            </a:r>
+            <a:r>
+              <a:rPr lang="de-DE" baseline="0" dirty="0" smtClean="0"/>
+              <a:t> Teil einer Bevölkerung</a:t>
+            </a:r>
+          </a:p>
+          <a:p>
+            <a:r>
+              <a:rPr lang="de-DE" baseline="0" dirty="0" smtClean="0"/>
+              <a:t>TN: 400.000 angeschrieben, aber Verlust gibt es ja immer</a:t>
+            </a:r>
+            <a:endParaRPr lang="de-DE" dirty="0"/>
+          </a:p>
+        </p:txBody>
+      </p:sp>
+      <p:sp>
+        <p:nvSpPr>
+          <p:cNvPr id="4" name="Foliennummernplatzhalter 3"/>
+          <p:cNvSpPr>
+            <a:spLocks noGrp="1"/>
+          </p:cNvSpPr>
+          <p:nvPr>
+            <p:ph type="sldNum" sz="quarter" idx="10"/>
+          </p:nvPr>
+        </p:nvSpPr>
+        <p:spPr/>
+        <p:txBody>
+          <a:bodyPr/>
+          <a:lstStyle/>
+          <a:p>
+            <a:fld id="{291A2AE1-9A89-46FB-B262-609F9F6D1590}" type="slidenum">
+              <a:rPr lang="de-DE" smtClean="0"/>
+              <a:t>13</a:t>
+            </a:fld>
+            <a:endParaRPr lang="de-DE"/>
+          </a:p>
+        </p:txBody>
+      </p:sp>
+    </p:spTree>
+    <p:extLst>
+      <p:ext uri="{BB962C8B-B14F-4D97-AF65-F5344CB8AC3E}">
+        <p14:creationId xmlns:p14="http://schemas.microsoft.com/office/powerpoint/2010/main" val="1991956707"/>
+      </p:ext>
+    </p:extLst>
+  </p:cSld>
+  <p:clrMapOvr>
+    <a:masterClrMapping/>
+  </p:clrMapOvr>
+</p:notes>
+</file>
+
+<file path=ppt/notesSlides/notesSlide7.xml><?xml version="1.0" encoding="utf-8"?>
+<p:notes xmlns:a="http://schemas.openxmlformats.org/drawingml/2006/main" xmlns:r="http://schemas.openxmlformats.org/officeDocument/2006/relationships" xmlns:p="http://schemas.openxmlformats.org/presentationml/2006/main">
+  <p:cSld>
+    <p:spTree>
+      <p:nvGrpSpPr>
+        <p:cNvPr id="1" name=""/>
+        <p:cNvGrpSpPr/>
+        <p:nvPr/>
+      </p:nvGrpSpPr>
+      <p:grpSpPr>
+        <a:xfrm>
+          <a:off x="0" y="0"/>
+          <a:ext cx="0" cy="0"/>
+          <a:chOff x="0" y="0"/>
+          <a:chExt cx="0" cy="0"/>
+        </a:xfrm>
+      </p:grpSpPr>
+      <p:sp>
+        <p:nvSpPr>
+          <p:cNvPr id="2" name="Folienbildplatzhalter 1"/>
+          <p:cNvSpPr>
+            <a:spLocks noGrp="1" noRot="1" noChangeAspect="1"/>
+          </p:cNvSpPr>
+          <p:nvPr>
+            <p:ph type="sldImg"/>
+          </p:nvPr>
+        </p:nvSpPr>
+        <p:spPr/>
+      </p:sp>
+      <p:sp>
+        <p:nvSpPr>
+          <p:cNvPr id="3" name="Notizenplatzhalter 2"/>
+          <p:cNvSpPr>
+            <a:spLocks noGrp="1"/>
+          </p:cNvSpPr>
+          <p:nvPr>
+            <p:ph type="body" idx="1"/>
+          </p:nvPr>
+        </p:nvSpPr>
+        <p:spPr/>
+        <p:txBody>
+          <a:bodyPr/>
+          <a:lstStyle/>
+          <a:p>
+            <a:r>
+              <a:rPr lang="de-DE" dirty="0" smtClean="0"/>
+              <a:t>Aktiv: postalische Fragebögen alle 2 -3</a:t>
+            </a:r>
+            <a:r>
+              <a:rPr lang="de-DE" baseline="0" dirty="0" smtClean="0"/>
+              <a:t> Jahre</a:t>
+            </a:r>
+          </a:p>
+          <a:p>
+            <a:r>
+              <a:rPr lang="de-DE" baseline="0" dirty="0" smtClean="0"/>
+              <a:t>Passiv: Verknüpfung mit Registern</a:t>
+            </a:r>
+            <a:endParaRPr lang="de-DE" dirty="0"/>
+          </a:p>
+        </p:txBody>
+      </p:sp>
+      <p:sp>
+        <p:nvSpPr>
+          <p:cNvPr id="4" name="Foliennummernplatzhalter 3"/>
+          <p:cNvSpPr>
+            <a:spLocks noGrp="1"/>
+          </p:cNvSpPr>
+          <p:nvPr>
+            <p:ph type="sldNum" sz="quarter" idx="10"/>
+          </p:nvPr>
+        </p:nvSpPr>
+        <p:spPr/>
+        <p:txBody>
+          <a:bodyPr/>
+          <a:lstStyle/>
+          <a:p>
+            <a:fld id="{291A2AE1-9A89-46FB-B262-609F9F6D1590}" type="slidenum">
+              <a:rPr lang="de-DE" smtClean="0"/>
+              <a:t>14</a:t>
+            </a:fld>
+            <a:endParaRPr lang="de-DE"/>
+          </a:p>
+        </p:txBody>
+      </p:sp>
+    </p:spTree>
+    <p:extLst>
+      <p:ext uri="{BB962C8B-B14F-4D97-AF65-F5344CB8AC3E}">
+        <p14:creationId xmlns:p14="http://schemas.microsoft.com/office/powerpoint/2010/main" val="3503475929"/>
+      </p:ext>
+    </p:extLst>
+  </p:cSld>
+  <p:clrMapOvr>
+    <a:masterClrMapping/>
+  </p:clrMapOvr>
+</p:notes>
+</file>
+
+<file path=ppt/notesSlides/notesSlide8.xml><?xml version="1.0" encoding="utf-8"?>
+<p:notes xmlns:a="http://schemas.openxmlformats.org/drawingml/2006/main" xmlns:r="http://schemas.openxmlformats.org/officeDocument/2006/relationships" xmlns:p="http://schemas.openxmlformats.org/presentationml/2006/main">
+  <p:cSld>
+    <p:spTree>
+      <p:nvGrpSpPr>
+        <p:cNvPr id="1" name=""/>
+        <p:cNvGrpSpPr/>
+        <p:nvPr/>
+      </p:nvGrpSpPr>
+      <p:grpSpPr>
+        <a:xfrm>
+          <a:off x="0" y="0"/>
+          <a:ext cx="0" cy="0"/>
+          <a:chOff x="0" y="0"/>
+          <a:chExt cx="0" cy="0"/>
+        </a:xfrm>
+      </p:grpSpPr>
+      <p:sp>
+        <p:nvSpPr>
+          <p:cNvPr id="2" name="Folienbildplatzhalter 1"/>
+          <p:cNvSpPr>
+            <a:spLocks noGrp="1" noRot="1" noChangeAspect="1"/>
+          </p:cNvSpPr>
+          <p:nvPr>
+            <p:ph type="sldImg"/>
+          </p:nvPr>
+        </p:nvSpPr>
+        <p:spPr/>
+      </p:sp>
+      <p:sp>
+        <p:nvSpPr>
+          <p:cNvPr id="3" name="Notizenplatzhalter 2"/>
+          <p:cNvSpPr>
+            <a:spLocks noGrp="1"/>
+          </p:cNvSpPr>
+          <p:nvPr>
+            <p:ph type="body" idx="1"/>
+          </p:nvPr>
+        </p:nvSpPr>
+        <p:spPr/>
+        <p:txBody>
+          <a:bodyPr/>
+          <a:lstStyle/>
+          <a:p>
+            <a:r>
+              <a:rPr lang="de-DE" dirty="0" smtClean="0"/>
+              <a:t>HK: RR, </a:t>
+            </a:r>
+            <a:r>
+              <a:rPr lang="de-DE" dirty="0" err="1" smtClean="0"/>
+              <a:t>Hf</a:t>
+            </a:r>
+            <a:r>
+              <a:rPr lang="de-DE" dirty="0" smtClean="0"/>
+              <a:t>, EKG, </a:t>
+            </a:r>
+            <a:r>
+              <a:rPr lang="de-DE" dirty="0" err="1" smtClean="0"/>
+              <a:t>Carotis</a:t>
+            </a:r>
+            <a:r>
+              <a:rPr lang="de-DE" dirty="0" smtClean="0"/>
+              <a:t>-Sonographie</a:t>
+            </a:r>
+          </a:p>
+          <a:p>
+            <a:r>
+              <a:rPr lang="de-DE" dirty="0" smtClean="0"/>
+              <a:t>Diab: </a:t>
+            </a:r>
+            <a:r>
+              <a:rPr lang="de-DE" sz="1200" kern="1200" dirty="0" smtClean="0">
+                <a:solidFill>
+                  <a:schemeClr val="tx1"/>
+                </a:solidFill>
+                <a:effectLst/>
+                <a:latin typeface="+mn-lt"/>
+                <a:ea typeface="+mn-ea"/>
+                <a:cs typeface="+mn-cs"/>
+              </a:rPr>
+              <a:t>Oraler-Glucose-Toleranz-Test, </a:t>
+            </a:r>
+            <a:r>
+              <a:rPr lang="de-DE" sz="1200" kern="1200" dirty="0" err="1" smtClean="0">
+                <a:solidFill>
+                  <a:schemeClr val="tx1"/>
+                </a:solidFill>
+                <a:effectLst/>
+                <a:latin typeface="+mn-lt"/>
+                <a:ea typeface="+mn-ea"/>
+                <a:cs typeface="+mn-cs"/>
+              </a:rPr>
+              <a:t>Advanced</a:t>
+            </a:r>
+            <a:r>
+              <a:rPr lang="de-DE" sz="1200" kern="1200" dirty="0" smtClean="0">
+                <a:solidFill>
+                  <a:schemeClr val="tx1"/>
+                </a:solidFill>
+                <a:effectLst/>
+                <a:latin typeface="+mn-lt"/>
+                <a:ea typeface="+mn-ea"/>
+                <a:cs typeface="+mn-cs"/>
+              </a:rPr>
+              <a:t>-</a:t>
+            </a:r>
+            <a:r>
+              <a:rPr lang="de-DE" sz="1200" kern="1200" dirty="0" err="1" smtClean="0">
+                <a:solidFill>
+                  <a:schemeClr val="tx1"/>
+                </a:solidFill>
+                <a:effectLst/>
+                <a:latin typeface="+mn-lt"/>
+                <a:ea typeface="+mn-ea"/>
+                <a:cs typeface="+mn-cs"/>
+              </a:rPr>
+              <a:t>Glycation</a:t>
+            </a:r>
+            <a:r>
+              <a:rPr lang="de-DE" sz="1200" kern="1200" dirty="0" smtClean="0">
+                <a:solidFill>
+                  <a:schemeClr val="tx1"/>
+                </a:solidFill>
+                <a:effectLst/>
+                <a:latin typeface="+mn-lt"/>
+                <a:ea typeface="+mn-ea"/>
+                <a:cs typeface="+mn-cs"/>
+              </a:rPr>
+              <a:t>-</a:t>
+            </a:r>
+            <a:r>
+              <a:rPr lang="de-DE" sz="1200" kern="1200" dirty="0" err="1" smtClean="0">
+                <a:solidFill>
+                  <a:schemeClr val="tx1"/>
+                </a:solidFill>
+                <a:effectLst/>
+                <a:latin typeface="+mn-lt"/>
+                <a:ea typeface="+mn-ea"/>
+                <a:cs typeface="+mn-cs"/>
+              </a:rPr>
+              <a:t>Endproducts</a:t>
+            </a:r>
+            <a:r>
+              <a:rPr lang="de-DE" sz="1200" kern="1200" dirty="0" smtClean="0">
+                <a:solidFill>
+                  <a:schemeClr val="tx1"/>
+                </a:solidFill>
+                <a:effectLst/>
+                <a:latin typeface="+mn-lt"/>
+                <a:ea typeface="+mn-ea"/>
+                <a:cs typeface="+mn-cs"/>
+              </a:rPr>
+              <a:t>-Messung der Haut</a:t>
+            </a:r>
+          </a:p>
+          <a:p>
+            <a:r>
+              <a:rPr lang="de-DE" sz="1200" kern="1200" dirty="0" err="1" smtClean="0">
+                <a:solidFill>
+                  <a:schemeClr val="tx1"/>
+                </a:solidFill>
+                <a:effectLst/>
+                <a:latin typeface="+mn-lt"/>
+                <a:ea typeface="+mn-ea"/>
+                <a:cs typeface="+mn-cs"/>
+              </a:rPr>
+              <a:t>Kogn</a:t>
+            </a:r>
+            <a:r>
+              <a:rPr lang="de-DE" sz="1200" kern="1200" dirty="0" smtClean="0">
+                <a:solidFill>
+                  <a:schemeClr val="tx1"/>
+                </a:solidFill>
+                <a:effectLst/>
+                <a:latin typeface="+mn-lt"/>
+                <a:ea typeface="+mn-ea"/>
+                <a:cs typeface="+mn-cs"/>
+              </a:rPr>
+              <a:t>: Testbatterie</a:t>
+            </a:r>
+            <a:br>
+              <a:rPr lang="de-DE" sz="1200" kern="1200" dirty="0" smtClean="0">
+                <a:solidFill>
+                  <a:schemeClr val="tx1"/>
+                </a:solidFill>
+                <a:effectLst/>
+                <a:latin typeface="+mn-lt"/>
+                <a:ea typeface="+mn-ea"/>
+                <a:cs typeface="+mn-cs"/>
+              </a:rPr>
+            </a:br>
+            <a:r>
+              <a:rPr lang="de-DE" sz="1200" kern="1200" dirty="0" err="1" smtClean="0">
+                <a:solidFill>
+                  <a:schemeClr val="tx1"/>
+                </a:solidFill>
+                <a:effectLst/>
+                <a:latin typeface="+mn-lt"/>
+                <a:ea typeface="+mn-ea"/>
+                <a:cs typeface="+mn-cs"/>
+              </a:rPr>
+              <a:t>Lufu</a:t>
+            </a:r>
+            <a:r>
+              <a:rPr lang="de-DE" sz="1200" kern="1200" dirty="0" smtClean="0">
+                <a:solidFill>
+                  <a:schemeClr val="tx1"/>
+                </a:solidFill>
+                <a:effectLst/>
+                <a:latin typeface="+mn-lt"/>
+                <a:ea typeface="+mn-ea"/>
+                <a:cs typeface="+mn-cs"/>
+              </a:rPr>
+              <a:t>: Spirometrie, exhaliertes Stickstoffmonoxid</a:t>
+            </a:r>
+          </a:p>
+          <a:p>
+            <a:r>
+              <a:rPr lang="de-DE" sz="1200" kern="1200" dirty="0" smtClean="0">
+                <a:solidFill>
+                  <a:schemeClr val="tx1"/>
+                </a:solidFill>
+                <a:effectLst/>
+                <a:latin typeface="+mn-lt"/>
+                <a:ea typeface="+mn-ea"/>
+                <a:cs typeface="+mn-cs"/>
+              </a:rPr>
+              <a:t>Muskel: Medizinische Untersuchung</a:t>
+            </a:r>
+          </a:p>
+          <a:p>
+            <a:r>
+              <a:rPr lang="de-DE" sz="1200" kern="1200" dirty="0" smtClean="0">
+                <a:solidFill>
+                  <a:schemeClr val="tx1"/>
+                </a:solidFill>
+                <a:effectLst/>
+                <a:latin typeface="+mn-lt"/>
+                <a:ea typeface="+mn-ea"/>
+                <a:cs typeface="+mn-cs"/>
+              </a:rPr>
+              <a:t>Mund: Zahnstatus, Untersuchung</a:t>
+            </a:r>
+            <a:r>
+              <a:rPr lang="de-DE" sz="1200" kern="1200" baseline="0" dirty="0" smtClean="0">
+                <a:solidFill>
+                  <a:schemeClr val="tx1"/>
+                </a:solidFill>
+                <a:effectLst/>
+                <a:latin typeface="+mn-lt"/>
+                <a:ea typeface="+mn-ea"/>
+                <a:cs typeface="+mn-cs"/>
+              </a:rPr>
+              <a:t> Mundhöhle</a:t>
+            </a:r>
+          </a:p>
+          <a:p>
+            <a:r>
+              <a:rPr lang="de-DE" dirty="0" smtClean="0"/>
+              <a:t>Sinne: Augenuntersuchung, Hör-, Riechtest</a:t>
+            </a:r>
+            <a:endParaRPr lang="de-DE" dirty="0"/>
+          </a:p>
+        </p:txBody>
+      </p:sp>
+      <p:sp>
+        <p:nvSpPr>
+          <p:cNvPr id="4" name="Foliennummernplatzhalter 3"/>
+          <p:cNvSpPr>
+            <a:spLocks noGrp="1"/>
+          </p:cNvSpPr>
+          <p:nvPr>
+            <p:ph type="sldNum" sz="quarter" idx="10"/>
+          </p:nvPr>
+        </p:nvSpPr>
+        <p:spPr/>
+        <p:txBody>
+          <a:bodyPr/>
+          <a:lstStyle/>
+          <a:p>
+            <a:fld id="{291A2AE1-9A89-46FB-B262-609F9F6D1590}" type="slidenum">
+              <a:rPr lang="de-DE" smtClean="0"/>
+              <a:t>15</a:t>
+            </a:fld>
+            <a:endParaRPr lang="de-DE"/>
+          </a:p>
+        </p:txBody>
+      </p:sp>
+    </p:spTree>
+    <p:extLst>
+      <p:ext uri="{BB962C8B-B14F-4D97-AF65-F5344CB8AC3E}">
+        <p14:creationId xmlns:p14="http://schemas.microsoft.com/office/powerpoint/2010/main" val="3856346814"/>
+      </p:ext>
+    </p:extLst>
+  </p:cSld>
+  <p:clrMapOvr>
+    <a:masterClrMapping/>
+  </p:clrMapOvr>
+</p:notes>
+</file>
+
+<file path=ppt/notesSlides/notesSlide9.xml><?xml version="1.0" encoding="utf-8"?>
+<p:notes xmlns:a="http://schemas.openxmlformats.org/drawingml/2006/main" xmlns:r="http://schemas.openxmlformats.org/officeDocument/2006/relationships" xmlns:p="http://schemas.openxmlformats.org/presentationml/2006/main">
+  <p:cSld>
+    <p:spTree>
+      <p:nvGrpSpPr>
+        <p:cNvPr id="1" name=""/>
+        <p:cNvGrpSpPr/>
+        <p:nvPr/>
+      </p:nvGrpSpPr>
+      <p:grpSpPr>
+        <a:xfrm>
+          <a:off x="0" y="0"/>
+          <a:ext cx="0" cy="0"/>
+          <a:chOff x="0" y="0"/>
+          <a:chExt cx="0" cy="0"/>
+        </a:xfrm>
+      </p:grpSpPr>
+      <p:sp>
+        <p:nvSpPr>
+          <p:cNvPr id="2" name="Folienbildplatzhalter 1"/>
+          <p:cNvSpPr>
+            <a:spLocks noGrp="1" noRot="1" noChangeAspect="1"/>
+          </p:cNvSpPr>
+          <p:nvPr>
+            <p:ph type="sldImg"/>
+          </p:nvPr>
+        </p:nvSpPr>
+        <p:spPr/>
+      </p:sp>
+      <p:sp>
+        <p:nvSpPr>
+          <p:cNvPr id="3" name="Notizenplatzhalter 2"/>
+          <p:cNvSpPr>
+            <a:spLocks noGrp="1"/>
+          </p:cNvSpPr>
+          <p:nvPr>
+            <p:ph type="body" idx="1"/>
+          </p:nvPr>
+        </p:nvSpPr>
+        <p:spPr/>
+        <p:txBody>
+          <a:bodyPr/>
+          <a:lstStyle/>
+          <a:p>
+            <a:r>
+              <a:rPr lang="de-DE" dirty="0" smtClean="0"/>
+              <a:t>Fitness: </a:t>
+            </a:r>
+            <a:r>
+              <a:rPr lang="de-DE" sz="1200" kern="1200" dirty="0" smtClean="0">
+                <a:solidFill>
+                  <a:schemeClr val="tx1"/>
+                </a:solidFill>
+                <a:effectLst/>
+                <a:latin typeface="+mn-lt"/>
+                <a:ea typeface="+mn-ea"/>
+                <a:cs typeface="+mn-cs"/>
+              </a:rPr>
+              <a:t>7-Tage-Akzelerometrie, kardiorespiratorischer Fitnesstest, Handgreifstärke</a:t>
+            </a:r>
+          </a:p>
+          <a:p>
+            <a:r>
+              <a:rPr lang="de-DE" dirty="0" err="1" smtClean="0"/>
+              <a:t>Anthro</a:t>
+            </a:r>
+            <a:r>
+              <a:rPr lang="de-DE" dirty="0" smtClean="0"/>
+              <a:t>:</a:t>
+            </a:r>
+            <a:r>
+              <a:rPr lang="de-DE" baseline="0" dirty="0" smtClean="0"/>
+              <a:t> </a:t>
+            </a:r>
+            <a:r>
+              <a:rPr lang="de-DE" sz="1200" kern="1200" dirty="0" smtClean="0">
+                <a:solidFill>
+                  <a:schemeClr val="tx1"/>
+                </a:solidFill>
+                <a:effectLst/>
+                <a:latin typeface="+mn-lt"/>
+                <a:ea typeface="+mn-ea"/>
+                <a:cs typeface="+mn-cs"/>
+              </a:rPr>
+              <a:t>Körpergewicht, Körpergröße, Taillen- und Hüftumfang</a:t>
+            </a:r>
+          </a:p>
+          <a:p>
+            <a:r>
+              <a:rPr lang="de-DE" dirty="0" smtClean="0"/>
+              <a:t>MRT: nur 30.000TN</a:t>
+            </a:r>
+          </a:p>
+          <a:p>
+            <a:r>
+              <a:rPr lang="de-DE" dirty="0" smtClean="0"/>
+              <a:t>Ultraschall: nur Teil</a:t>
+            </a:r>
+            <a:r>
+              <a:rPr lang="de-DE" baseline="0" dirty="0" smtClean="0"/>
+              <a:t> der TN</a:t>
+            </a:r>
+          </a:p>
+          <a:p>
+            <a:r>
+              <a:rPr lang="de-DE" baseline="0" dirty="0" smtClean="0"/>
+              <a:t>Bioproben: </a:t>
+            </a:r>
+            <a:r>
+              <a:rPr lang="de-DE" sz="1200" kern="1200" dirty="0" smtClean="0">
+                <a:solidFill>
+                  <a:schemeClr val="tx1"/>
+                </a:solidFill>
+                <a:effectLst/>
+                <a:latin typeface="+mn-lt"/>
+                <a:ea typeface="+mn-ea"/>
+                <a:cs typeface="+mn-cs"/>
+              </a:rPr>
+              <a:t>Serum, Blut, Plasma, </a:t>
+            </a:r>
+            <a:r>
+              <a:rPr lang="de-DE" sz="1200" kern="1200" dirty="0" err="1" smtClean="0">
+                <a:solidFill>
+                  <a:schemeClr val="tx1"/>
+                </a:solidFill>
+                <a:effectLst/>
+                <a:latin typeface="+mn-lt"/>
+                <a:ea typeface="+mn-ea"/>
+                <a:cs typeface="+mn-cs"/>
+              </a:rPr>
+              <a:t>Erys</a:t>
+            </a:r>
+            <a:r>
+              <a:rPr lang="de-DE" sz="1200" kern="1200" dirty="0" smtClean="0">
+                <a:solidFill>
+                  <a:schemeClr val="tx1"/>
+                </a:solidFill>
+                <a:effectLst/>
+                <a:latin typeface="+mn-lt"/>
+                <a:ea typeface="+mn-ea"/>
+                <a:cs typeface="+mn-cs"/>
+              </a:rPr>
+              <a:t>, DNA, RNA, lebende Zellen, Speichel, Nasenabstrich, Urin, Stuhl</a:t>
+            </a:r>
+          </a:p>
+          <a:p>
+            <a:r>
+              <a:rPr lang="de-DE" sz="1200" kern="1200" dirty="0" smtClean="0">
+                <a:solidFill>
+                  <a:schemeClr val="tx1"/>
+                </a:solidFill>
+                <a:effectLst/>
+                <a:latin typeface="+mn-lt"/>
+                <a:ea typeface="+mn-ea"/>
+                <a:cs typeface="+mn-cs"/>
+              </a:rPr>
+              <a:t>Sozioökonom: Familie und Ausbildung</a:t>
+            </a:r>
+          </a:p>
+          <a:p>
+            <a:r>
+              <a:rPr lang="de-DE" sz="1200" kern="1200" dirty="0" smtClean="0">
+                <a:solidFill>
+                  <a:schemeClr val="tx1"/>
+                </a:solidFill>
+                <a:effectLst/>
+                <a:latin typeface="+mn-lt"/>
+                <a:ea typeface="+mn-ea"/>
+                <a:cs typeface="+mn-cs"/>
+              </a:rPr>
+              <a:t>Gesundheit:</a:t>
+            </a:r>
+            <a:r>
+              <a:rPr lang="de-DE" sz="1200" kern="1200" baseline="0" dirty="0" smtClean="0">
+                <a:solidFill>
+                  <a:schemeClr val="tx1"/>
+                </a:solidFill>
+                <a:effectLst/>
+                <a:latin typeface="+mn-lt"/>
+                <a:ea typeface="+mn-ea"/>
+                <a:cs typeface="+mn-cs"/>
+              </a:rPr>
+              <a:t> medizinische Vorgeschichte, Einnahme von </a:t>
+            </a:r>
+            <a:r>
+              <a:rPr lang="de-DE" sz="1200" kern="1200" baseline="0" dirty="0" err="1" smtClean="0">
+                <a:solidFill>
+                  <a:schemeClr val="tx1"/>
+                </a:solidFill>
+                <a:effectLst/>
+                <a:latin typeface="+mn-lt"/>
+                <a:ea typeface="+mn-ea"/>
+                <a:cs typeface="+mn-cs"/>
+              </a:rPr>
+              <a:t>Medis</a:t>
+            </a:r>
+            <a:endParaRPr lang="de-DE" sz="1200" kern="1200" baseline="0" dirty="0" smtClean="0">
+              <a:solidFill>
+                <a:schemeClr val="tx1"/>
+              </a:solidFill>
+              <a:effectLst/>
+              <a:latin typeface="+mn-lt"/>
+              <a:ea typeface="+mn-ea"/>
+              <a:cs typeface="+mn-cs"/>
+            </a:endParaRPr>
+          </a:p>
+          <a:p>
+            <a:r>
+              <a:rPr lang="de-DE" sz="1200" kern="1200" baseline="0" dirty="0" smtClean="0">
+                <a:solidFill>
+                  <a:schemeClr val="tx1"/>
+                </a:solidFill>
+                <a:effectLst/>
+                <a:latin typeface="+mn-lt"/>
+                <a:ea typeface="+mn-ea"/>
+                <a:cs typeface="+mn-cs"/>
+              </a:rPr>
+              <a:t>Lebensstil: Ernährung körperliche Aktivität</a:t>
+            </a:r>
+          </a:p>
+          <a:p>
+            <a:endParaRPr lang="de-DE" sz="1200" kern="1200" baseline="0" dirty="0" smtClean="0">
+              <a:solidFill>
+                <a:schemeClr val="tx1"/>
+              </a:solidFill>
+              <a:effectLst/>
+              <a:latin typeface="+mn-lt"/>
+              <a:ea typeface="+mn-ea"/>
+              <a:cs typeface="+mn-cs"/>
+            </a:endParaRPr>
+          </a:p>
+          <a:p>
+            <a:r>
+              <a:rPr lang="de-DE" sz="1200" kern="1200" baseline="0" dirty="0" smtClean="0">
+                <a:solidFill>
+                  <a:schemeClr val="tx1"/>
+                </a:solidFill>
+                <a:effectLst/>
+                <a:latin typeface="+mn-lt"/>
+                <a:ea typeface="+mn-ea"/>
+                <a:cs typeface="+mn-cs"/>
+              </a:rPr>
+              <a:t>Erfassung vieler Faktoren, mögen zunächst bedeutungslos erscheinen</a:t>
+            </a:r>
+          </a:p>
+          <a:p>
+            <a:r>
+              <a:rPr lang="de-DE" sz="1200" kern="1200" baseline="0" dirty="0" smtClean="0">
+                <a:solidFill>
+                  <a:schemeClr val="tx1"/>
+                </a:solidFill>
+                <a:effectLst/>
+                <a:latin typeface="+mn-lt"/>
+                <a:ea typeface="+mn-ea"/>
+                <a:cs typeface="+mn-cs"/>
+              </a:rPr>
+              <a:t>Später kann sich herausstellen, dass auf Krankheiten hinweisen</a:t>
+            </a:r>
+          </a:p>
+          <a:p>
+            <a:r>
+              <a:rPr lang="de-DE" sz="1200" kern="1200" baseline="0" dirty="0" smtClean="0">
+                <a:solidFill>
+                  <a:schemeClr val="tx1"/>
+                </a:solidFill>
+                <a:effectLst/>
+                <a:latin typeface="+mn-lt"/>
+                <a:ea typeface="+mn-ea"/>
+                <a:cs typeface="+mn-cs"/>
+              </a:rPr>
+              <a:t>Zusammenwirken verschiedener Faktoren und wie sie zu Krankheit führen können im Nachhinein ermittelbar</a:t>
+            </a:r>
+          </a:p>
+          <a:p>
+            <a:r>
+              <a:rPr lang="de-DE" sz="1200" kern="1200" baseline="0" dirty="0" smtClean="0">
+                <a:solidFill>
+                  <a:schemeClr val="tx1"/>
+                </a:solidFill>
+                <a:effectLst/>
+                <a:latin typeface="+mn-lt"/>
+                <a:ea typeface="+mn-ea"/>
+                <a:cs typeface="+mn-cs"/>
+              </a:rPr>
+              <a:t>=&gt; Krankheiten früher erkannt und effektiver behandelt werden</a:t>
+            </a:r>
+            <a:endParaRPr lang="de-DE" dirty="0"/>
+          </a:p>
+        </p:txBody>
+      </p:sp>
+      <p:sp>
+        <p:nvSpPr>
+          <p:cNvPr id="4" name="Foliennummernplatzhalter 3"/>
+          <p:cNvSpPr>
+            <a:spLocks noGrp="1"/>
+          </p:cNvSpPr>
+          <p:nvPr>
+            <p:ph type="sldNum" sz="quarter" idx="10"/>
+          </p:nvPr>
+        </p:nvSpPr>
+        <p:spPr/>
+        <p:txBody>
+          <a:bodyPr/>
+          <a:lstStyle/>
+          <a:p>
+            <a:fld id="{291A2AE1-9A89-46FB-B262-609F9F6D1590}" type="slidenum">
+              <a:rPr lang="de-DE" smtClean="0"/>
+              <a:t>16</a:t>
+            </a:fld>
+            <a:endParaRPr lang="de-DE"/>
+          </a:p>
+        </p:txBody>
+      </p:sp>
+    </p:spTree>
+    <p:extLst>
+      <p:ext uri="{BB962C8B-B14F-4D97-AF65-F5344CB8AC3E}">
+        <p14:creationId xmlns:p14="http://schemas.microsoft.com/office/powerpoint/2010/main" val="3500684610"/>
       </p:ext>
     </p:extLst>
   </p:cSld>
@@ -1657,7 +3176,7 @@
           <a:p>
             <a:fld id="{430DCDF4-4212-41DE-881A-86CC5F4C4960}" type="datetime1">
               <a:rPr lang="en-US" smtClean="0"/>
-              <a:t>3/28/2015</a:t>
+              <a:t>3/29/2015</a:t>
             </a:fld>
             <a:endParaRPr lang="en-US" dirty="0"/>
           </a:p>
@@ -1936,7 +3455,7 @@
           <a:p>
             <a:fld id="{7D7F22C2-E00C-402C-9237-97B2DDDB1C1E}" type="datetime1">
               <a:rPr lang="en-US" smtClean="0"/>
-              <a:t>3/28/2015</a:t>
+              <a:t>3/29/2015</a:t>
             </a:fld>
             <a:endParaRPr lang="en-US" dirty="0"/>
           </a:p>
@@ -2231,7 +3750,7 @@
           <a:p>
             <a:fld id="{4751C775-F499-41CA-BB69-5F0CE1DC728B}" type="datetime1">
               <a:rPr lang="en-US" smtClean="0"/>
-              <a:t>3/28/2015</a:t>
+              <a:t>3/29/2015</a:t>
             </a:fld>
             <a:endParaRPr lang="en-US" dirty="0"/>
           </a:p>
@@ -2553,7 +4072,7 @@
           <a:p>
             <a:fld id="{EF0B729F-5E1E-40E7-8D1F-2FBC0AA7C9CD}" type="datetime1">
               <a:rPr lang="en-US" smtClean="0"/>
-              <a:t>3/28/2015</a:t>
+              <a:t>3/29/2015</a:t>
             </a:fld>
             <a:endParaRPr lang="en-US" dirty="0"/>
           </a:p>
@@ -2848,7 +4367,7 @@
           <a:p>
             <a:fld id="{6C610283-F1E1-40D0-ACF0-C635052CA35C}" type="datetime1">
               <a:rPr lang="en-US" smtClean="0"/>
-              <a:t>3/28/2015</a:t>
+              <a:t>3/29/2015</a:t>
             </a:fld>
             <a:endParaRPr lang="en-US" dirty="0"/>
           </a:p>
@@ -3222,7 +4741,7 @@
           <a:p>
             <a:fld id="{DDCC8832-2E28-430A-AD8F-583F9F33222D}" type="datetime1">
               <a:rPr lang="en-US" smtClean="0"/>
-              <a:t>3/28/2015</a:t>
+              <a:t>3/29/2015</a:t>
             </a:fld>
             <a:endParaRPr lang="en-US" dirty="0"/>
           </a:p>
@@ -3380,7 +4899,7 @@
           <a:p>
             <a:fld id="{76E487D9-92EA-4374-B9A8-0C938596B06B}" type="datetime1">
               <a:rPr lang="en-US" smtClean="0"/>
-              <a:t>3/28/2015</a:t>
+              <a:t>3/29/2015</a:t>
             </a:fld>
             <a:endParaRPr lang="en-US" dirty="0"/>
           </a:p>
@@ -3541,7 +5060,7 @@
           <a:p>
             <a:fld id="{03B2E87A-4C56-4FB1-83A8-C433C44AFBA9}" type="datetime1">
               <a:rPr lang="en-US" smtClean="0"/>
-              <a:t>3/28/2015</a:t>
+              <a:t>3/29/2015</a:t>
             </a:fld>
             <a:endParaRPr lang="en-US" dirty="0"/>
           </a:p>
@@ -3721,7 +5240,7 @@
           <a:p>
             <a:fld id="{A5828E15-EAE5-4696-A498-9462A8D07DB3}" type="datetime1">
               <a:rPr lang="en-US" smtClean="0"/>
-              <a:t>3/28/2015</a:t>
+              <a:t>3/29/2015</a:t>
             </a:fld>
             <a:endParaRPr lang="en-US" dirty="0"/>
           </a:p>
@@ -3963,7 +5482,7 @@
           <a:p>
             <a:fld id="{30C89575-A7F9-45D9-8DD0-EEE9ED1F7FA0}" type="datetime1">
               <a:rPr lang="en-US" smtClean="0"/>
-              <a:t>3/28/2015</a:t>
+              <a:t>3/29/2015</a:t>
             </a:fld>
             <a:endParaRPr lang="en-US" dirty="0"/>
           </a:p>
@@ -4183,7 +5702,7 @@
           <a:p>
             <a:fld id="{7A131F54-E68E-47BE-8946-F526F364CBA6}" type="datetime1">
               <a:rPr lang="en-US" smtClean="0"/>
-              <a:t>3/28/2015</a:t>
+              <a:t>3/29/2015</a:t>
             </a:fld>
             <a:endParaRPr lang="en-US" dirty="0"/>
           </a:p>
@@ -4538,7 +6057,7 @@
           <a:p>
             <a:fld id="{54938A4C-ABDD-4D7F-9EE8-D2212DFA111A}" type="datetime1">
               <a:rPr lang="en-US" smtClean="0"/>
-              <a:t>3/28/2015</a:t>
+              <a:t>3/29/2015</a:t>
             </a:fld>
             <a:endParaRPr lang="en-US" dirty="0"/>
           </a:p>
@@ -4642,7 +6161,7 @@
           <a:p>
             <a:fld id="{472087FD-69A5-4863-93C8-147616460B5F}" type="datetime1">
               <a:rPr lang="en-US" smtClean="0"/>
-              <a:t>3/28/2015</a:t>
+              <a:t>3/29/2015</a:t>
             </a:fld>
             <a:endParaRPr lang="en-US" dirty="0"/>
           </a:p>
@@ -4718,7 +6237,7 @@
           <a:p>
             <a:fld id="{DE67AA65-3958-4B15-93E3-62DB88057388}" type="datetime1">
               <a:rPr lang="en-US" smtClean="0"/>
-              <a:t>3/28/2015</a:t>
+              <a:t>3/29/2015</a:t>
             </a:fld>
             <a:endParaRPr lang="en-US" dirty="0"/>
           </a:p>
@@ -4954,7 +6473,7 @@
           <a:p>
             <a:fld id="{3A3AF593-EE7A-4564-A95B-6C86BAEF9839}" type="datetime1">
               <a:rPr lang="en-US" smtClean="0"/>
-              <a:t>3/28/2015</a:t>
+              <a:t>3/29/2015</a:t>
             </a:fld>
             <a:endParaRPr lang="en-US" dirty="0"/>
           </a:p>
@@ -5198,7 +6717,7 @@
           <a:p>
             <a:fld id="{D226D4E0-B61D-4B17-878D-83CEB6B35F48}" type="datetime1">
               <a:rPr lang="en-US" smtClean="0"/>
-              <a:t>3/28/2015</a:t>
+              <a:t>3/29/2015</a:t>
             </a:fld>
             <a:endParaRPr lang="en-US" dirty="0"/>
           </a:p>
@@ -5922,7 +7441,7 @@
           <a:p>
             <a:fld id="{FA7EC809-ED1F-4983-9906-520EA3F002C5}" type="datetime1">
               <a:rPr lang="en-US" smtClean="0"/>
-              <a:t>3/28/2015</a:t>
+              <a:t>3/29/2015</a:t>
             </a:fld>
             <a:endParaRPr lang="en-US" dirty="0"/>
           </a:p>
@@ -6600,10 +8119,10 @@
             </a:r>
           </a:p>
           <a:p>
-            <a:r>
-              <a:rPr lang="de-DE" dirty="0" smtClean="0"/>
-              <a:t>Samstag, 28. März 2015</a:t>
-            </a:r>
+            <a:fld id="{B68A97D9-23A2-4961-BD27-93DAEBE0E1E1}" type="datetime2">
+              <a:rPr lang="de-DE" smtClean="0"/>
+              <a:t>Sonntag, 29. März 2015</a:t>
+            </a:fld>
             <a:endParaRPr lang="de-DE" dirty="0"/>
           </a:p>
         </p:txBody>
@@ -6655,6 +8174,36 @@
           </a:p>
         </p:txBody>
       </p:sp>
+      <p:pic>
+        <p:nvPicPr>
+          <p:cNvPr id="7" name="Grafik 6"/>
+          <p:cNvPicPr>
+            <a:picLocks noChangeAspect="1"/>
+          </p:cNvPicPr>
+          <p:nvPr/>
+        </p:nvPicPr>
+        <p:blipFill>
+          <a:blip r:embed="rId2">
+            <a:extLst>
+              <a:ext uri="{28A0092B-C50C-407E-A947-70E740481C1C}">
+                <a14:useLocalDpi xmlns:a14="http://schemas.microsoft.com/office/drawing/2010/main" val="0"/>
+              </a:ext>
+            </a:extLst>
+          </a:blip>
+          <a:stretch>
+            <a:fillRect/>
+          </a:stretch>
+        </p:blipFill>
+        <p:spPr>
+          <a:xfrm>
+            <a:off x="747946" y="4226808"/>
+            <a:ext cx="1377915" cy="1292242"/>
+          </a:xfrm>
+          <a:prstGeom prst="rect">
+            <a:avLst/>
+          </a:prstGeom>
+        </p:spPr>
+      </p:pic>
     </p:spTree>
     <p:extLst>
       <p:ext uri="{BB962C8B-B14F-4D97-AF65-F5344CB8AC3E}">
@@ -6675,6 +8224,1289 @@
 </p:sld>
 </file>
 
+<file path=ppt/slides/slide10.xml><?xml version="1.0" encoding="utf-8"?>
+<p:sld xmlns:a="http://schemas.openxmlformats.org/drawingml/2006/main" xmlns:r="http://schemas.openxmlformats.org/officeDocument/2006/relationships" xmlns:p="http://schemas.openxmlformats.org/presentationml/2006/main">
+  <p:cSld>
+    <p:spTree>
+      <p:nvGrpSpPr>
+        <p:cNvPr id="1" name=""/>
+        <p:cNvGrpSpPr/>
+        <p:nvPr/>
+      </p:nvGrpSpPr>
+      <p:grpSpPr>
+        <a:xfrm>
+          <a:off x="0" y="0"/>
+          <a:ext cx="0" cy="0"/>
+          <a:chOff x="0" y="0"/>
+          <a:chExt cx="0" cy="0"/>
+        </a:xfrm>
+      </p:grpSpPr>
+      <p:sp>
+        <p:nvSpPr>
+          <p:cNvPr id="2" name="Titel 1"/>
+          <p:cNvSpPr>
+            <a:spLocks noGrp="1"/>
+          </p:cNvSpPr>
+          <p:nvPr>
+            <p:ph type="title"/>
+          </p:nvPr>
+        </p:nvSpPr>
+        <p:spPr/>
+        <p:txBody>
+          <a:bodyPr/>
+          <a:lstStyle/>
+          <a:p>
+            <a:r>
+              <a:rPr lang="de-DE" dirty="0" smtClean="0"/>
+              <a:t>Studienziele &amp; -aufgaben</a:t>
+            </a:r>
+            <a:endParaRPr lang="de-DE" dirty="0"/>
+          </a:p>
+        </p:txBody>
+      </p:sp>
+      <p:sp>
+        <p:nvSpPr>
+          <p:cNvPr id="3" name="Inhaltsplatzhalter 2"/>
+          <p:cNvSpPr>
+            <a:spLocks noGrp="1"/>
+          </p:cNvSpPr>
+          <p:nvPr>
+            <p:ph idx="1"/>
+          </p:nvPr>
+        </p:nvSpPr>
+        <p:spPr/>
+        <p:txBody>
+          <a:bodyPr/>
+          <a:lstStyle/>
+          <a:p>
+            <a:pPr lvl="0"/>
+            <a:r>
+              <a:rPr lang="de-DE" dirty="0"/>
+              <a:t>Aufklärung von Ursachen chronischer Erkrankungen und ihrem Zusammenhang mit Lebensstil, Umwelt-, genetischen und soziodemographischen Faktoren </a:t>
+            </a:r>
+            <a:endParaRPr lang="de-DE" dirty="0" smtClean="0"/>
+          </a:p>
+          <a:p>
+            <a:r>
+              <a:rPr lang="de-DE" dirty="0"/>
+              <a:t>Identifikation neuer Krankheitsrisikofaktoren</a:t>
+            </a:r>
+          </a:p>
+          <a:p>
+            <a:r>
+              <a:rPr lang="de-DE" dirty="0"/>
+              <a:t>Auswirkungen geografischer und sozioökonomischer Ungleichheiten auf den Gesundheitsstand und das Krankheitsrisiko in Deutschland</a:t>
+            </a:r>
+          </a:p>
+          <a:p>
+            <a:pPr lvl="0"/>
+            <a:endParaRPr lang="de-DE" dirty="0"/>
+          </a:p>
+          <a:p>
+            <a:endParaRPr lang="de-DE" dirty="0"/>
+          </a:p>
+        </p:txBody>
+      </p:sp>
+      <p:sp>
+        <p:nvSpPr>
+          <p:cNvPr id="4" name="Fußzeilenplatzhalter 3"/>
+          <p:cNvSpPr>
+            <a:spLocks noGrp="1"/>
+          </p:cNvSpPr>
+          <p:nvPr>
+            <p:ph type="ftr" sz="quarter" idx="11"/>
+          </p:nvPr>
+        </p:nvSpPr>
+        <p:spPr/>
+        <p:txBody>
+          <a:bodyPr/>
+          <a:lstStyle/>
+          <a:p>
+            <a:r>
+              <a:rPr lang="en-US" smtClean="0"/>
+              <a:t>| Dominik Meixner | Dominique Cheray |</a:t>
+            </a:r>
+            <a:endParaRPr lang="en-US" dirty="0"/>
+          </a:p>
+        </p:txBody>
+      </p:sp>
+    </p:spTree>
+    <p:extLst>
+      <p:ext uri="{BB962C8B-B14F-4D97-AF65-F5344CB8AC3E}">
+        <p14:creationId xmlns:p14="http://schemas.microsoft.com/office/powerpoint/2010/main" val="1310610028"/>
+      </p:ext>
+    </p:extLst>
+  </p:cSld>
+  <p:clrMapOvr>
+    <a:masterClrMapping/>
+  </p:clrMapOvr>
+</p:sld>
+</file>
+
+<file path=ppt/slides/slide11.xml><?xml version="1.0" encoding="utf-8"?>
+<p:sld xmlns:a="http://schemas.openxmlformats.org/drawingml/2006/main" xmlns:r="http://schemas.openxmlformats.org/officeDocument/2006/relationships" xmlns:p="http://schemas.openxmlformats.org/presentationml/2006/main">
+  <p:cSld>
+    <p:spTree>
+      <p:nvGrpSpPr>
+        <p:cNvPr id="1" name=""/>
+        <p:cNvGrpSpPr/>
+        <p:nvPr/>
+      </p:nvGrpSpPr>
+      <p:grpSpPr>
+        <a:xfrm>
+          <a:off x="0" y="0"/>
+          <a:ext cx="0" cy="0"/>
+          <a:chOff x="0" y="0"/>
+          <a:chExt cx="0" cy="0"/>
+        </a:xfrm>
+      </p:grpSpPr>
+      <p:sp>
+        <p:nvSpPr>
+          <p:cNvPr id="2" name="Titel 1"/>
+          <p:cNvSpPr>
+            <a:spLocks noGrp="1"/>
+          </p:cNvSpPr>
+          <p:nvPr>
+            <p:ph type="title"/>
+          </p:nvPr>
+        </p:nvSpPr>
+        <p:spPr/>
+        <p:txBody>
+          <a:bodyPr/>
+          <a:lstStyle/>
+          <a:p>
+            <a:r>
+              <a:rPr lang="de-DE" dirty="0"/>
+              <a:t>Studienziele &amp; -aufgaben</a:t>
+            </a:r>
+          </a:p>
+        </p:txBody>
+      </p:sp>
+      <p:sp>
+        <p:nvSpPr>
+          <p:cNvPr id="3" name="Inhaltsplatzhalter 2"/>
+          <p:cNvSpPr>
+            <a:spLocks noGrp="1"/>
+          </p:cNvSpPr>
+          <p:nvPr>
+            <p:ph idx="1"/>
+          </p:nvPr>
+        </p:nvSpPr>
+        <p:spPr/>
+        <p:txBody>
+          <a:bodyPr/>
+          <a:lstStyle/>
+          <a:p>
+            <a:pPr lvl="0"/>
+            <a:r>
+              <a:rPr lang="de-DE" dirty="0"/>
+              <a:t>Entwicklung von Risikovorhersagemodellen für chronische Erkrankungen</a:t>
+            </a:r>
+          </a:p>
+          <a:p>
+            <a:pPr lvl="0"/>
+            <a:r>
+              <a:rPr lang="de-DE" dirty="0"/>
+              <a:t>Entwicklung personalisierter Präventionsstrategien</a:t>
+            </a:r>
+          </a:p>
+          <a:p>
+            <a:pPr lvl="0"/>
+            <a:r>
+              <a:rPr lang="de-DE"/>
+              <a:t>Evaluation von Markern als effektive Hilfsmittel zur Früherkennung von chronischen </a:t>
+            </a:r>
+            <a:r>
+              <a:rPr lang="de-DE" smtClean="0"/>
+              <a:t>Krankheiten</a:t>
+            </a:r>
+            <a:endParaRPr lang="de-DE"/>
+          </a:p>
+        </p:txBody>
+      </p:sp>
+      <p:sp>
+        <p:nvSpPr>
+          <p:cNvPr id="4" name="Fußzeilenplatzhalter 3"/>
+          <p:cNvSpPr>
+            <a:spLocks noGrp="1"/>
+          </p:cNvSpPr>
+          <p:nvPr>
+            <p:ph type="ftr" sz="quarter" idx="11"/>
+          </p:nvPr>
+        </p:nvSpPr>
+        <p:spPr/>
+        <p:txBody>
+          <a:bodyPr/>
+          <a:lstStyle/>
+          <a:p>
+            <a:r>
+              <a:rPr lang="en-US" smtClean="0"/>
+              <a:t>| Dominik Meixner | Dominique Cheray |</a:t>
+            </a:r>
+            <a:endParaRPr lang="en-US" dirty="0"/>
+          </a:p>
+        </p:txBody>
+      </p:sp>
+    </p:spTree>
+    <p:extLst>
+      <p:ext uri="{BB962C8B-B14F-4D97-AF65-F5344CB8AC3E}">
+        <p14:creationId xmlns:p14="http://schemas.microsoft.com/office/powerpoint/2010/main" val="1097216019"/>
+      </p:ext>
+    </p:extLst>
+  </p:cSld>
+  <p:clrMapOvr>
+    <a:masterClrMapping/>
+  </p:clrMapOvr>
+</p:sld>
+</file>
+
+<file path=ppt/slides/slide12.xml><?xml version="1.0" encoding="utf-8"?>
+<p:sld xmlns:a="http://schemas.openxmlformats.org/drawingml/2006/main" xmlns:r="http://schemas.openxmlformats.org/officeDocument/2006/relationships" xmlns:p="http://schemas.openxmlformats.org/presentationml/2006/main">
+  <p:cSld>
+    <p:spTree>
+      <p:nvGrpSpPr>
+        <p:cNvPr id="1" name=""/>
+        <p:cNvGrpSpPr/>
+        <p:nvPr/>
+      </p:nvGrpSpPr>
+      <p:grpSpPr>
+        <a:xfrm>
+          <a:off x="0" y="0"/>
+          <a:ext cx="0" cy="0"/>
+          <a:chOff x="0" y="0"/>
+          <a:chExt cx="0" cy="0"/>
+        </a:xfrm>
+      </p:grpSpPr>
+      <p:sp>
+        <p:nvSpPr>
+          <p:cNvPr id="2" name="Titel 1"/>
+          <p:cNvSpPr>
+            <a:spLocks noGrp="1"/>
+          </p:cNvSpPr>
+          <p:nvPr>
+            <p:ph type="title"/>
+          </p:nvPr>
+        </p:nvSpPr>
+        <p:spPr/>
+        <p:txBody>
+          <a:bodyPr/>
+          <a:lstStyle/>
+          <a:p>
+            <a:r>
+              <a:rPr lang="de-DE" dirty="0" smtClean="0"/>
+              <a:t>Studienaufbau</a:t>
+            </a:r>
+            <a:endParaRPr lang="de-DE" dirty="0"/>
+          </a:p>
+        </p:txBody>
+      </p:sp>
+      <p:sp>
+        <p:nvSpPr>
+          <p:cNvPr id="3" name="Textplatzhalter 2"/>
+          <p:cNvSpPr>
+            <a:spLocks noGrp="1"/>
+          </p:cNvSpPr>
+          <p:nvPr>
+            <p:ph type="body" idx="1"/>
+          </p:nvPr>
+        </p:nvSpPr>
+        <p:spPr/>
+        <p:txBody>
+          <a:bodyPr/>
+          <a:lstStyle/>
+          <a:p>
+            <a:endParaRPr lang="de-DE"/>
+          </a:p>
+        </p:txBody>
+      </p:sp>
+      <p:sp>
+        <p:nvSpPr>
+          <p:cNvPr id="4" name="Fußzeilenplatzhalter 3"/>
+          <p:cNvSpPr>
+            <a:spLocks noGrp="1"/>
+          </p:cNvSpPr>
+          <p:nvPr>
+            <p:ph type="ftr" sz="quarter" idx="11"/>
+          </p:nvPr>
+        </p:nvSpPr>
+        <p:spPr/>
+        <p:txBody>
+          <a:bodyPr/>
+          <a:lstStyle/>
+          <a:p>
+            <a:r>
+              <a:rPr lang="en-US" smtClean="0"/>
+              <a:t>| Dominik Meixner | Dominique Cheray |</a:t>
+            </a:r>
+            <a:endParaRPr lang="en-US" dirty="0"/>
+          </a:p>
+        </p:txBody>
+      </p:sp>
+      <p:pic>
+        <p:nvPicPr>
+          <p:cNvPr id="5" name="Grafik 4"/>
+          <p:cNvPicPr>
+            <a:picLocks noChangeAspect="1"/>
+          </p:cNvPicPr>
+          <p:nvPr/>
+        </p:nvPicPr>
+        <p:blipFill>
+          <a:blip r:embed="rId2">
+            <a:extLst>
+              <a:ext uri="{28A0092B-C50C-407E-A947-70E740481C1C}">
+                <a14:useLocalDpi xmlns:a14="http://schemas.microsoft.com/office/drawing/2010/main" val="0"/>
+              </a:ext>
+            </a:extLst>
+          </a:blip>
+          <a:stretch>
+            <a:fillRect/>
+          </a:stretch>
+        </p:blipFill>
+        <p:spPr>
+          <a:xfrm>
+            <a:off x="6646586" y="683663"/>
+            <a:ext cx="1838582" cy="1724266"/>
+          </a:xfrm>
+          <a:prstGeom prst="rect">
+            <a:avLst/>
+          </a:prstGeom>
+        </p:spPr>
+      </p:pic>
+    </p:spTree>
+    <p:extLst>
+      <p:ext uri="{BB962C8B-B14F-4D97-AF65-F5344CB8AC3E}">
+        <p14:creationId xmlns:p14="http://schemas.microsoft.com/office/powerpoint/2010/main" val="2328165854"/>
+      </p:ext>
+    </p:extLst>
+  </p:cSld>
+  <p:clrMapOvr>
+    <a:masterClrMapping/>
+  </p:clrMapOvr>
+</p:sld>
+</file>
+
+<file path=ppt/slides/slide13.xml><?xml version="1.0" encoding="utf-8"?>
+<p:sld xmlns:a="http://schemas.openxmlformats.org/drawingml/2006/main" xmlns:r="http://schemas.openxmlformats.org/officeDocument/2006/relationships" xmlns:p="http://schemas.openxmlformats.org/presentationml/2006/main">
+  <p:cSld>
+    <p:spTree>
+      <p:nvGrpSpPr>
+        <p:cNvPr id="1" name=""/>
+        <p:cNvGrpSpPr/>
+        <p:nvPr/>
+      </p:nvGrpSpPr>
+      <p:grpSpPr>
+        <a:xfrm>
+          <a:off x="0" y="0"/>
+          <a:ext cx="0" cy="0"/>
+          <a:chOff x="0" y="0"/>
+          <a:chExt cx="0" cy="0"/>
+        </a:xfrm>
+      </p:grpSpPr>
+      <p:sp>
+        <p:nvSpPr>
+          <p:cNvPr id="2" name="Titel 1"/>
+          <p:cNvSpPr>
+            <a:spLocks noGrp="1"/>
+          </p:cNvSpPr>
+          <p:nvPr>
+            <p:ph type="title"/>
+          </p:nvPr>
+        </p:nvSpPr>
+        <p:spPr/>
+        <p:txBody>
+          <a:bodyPr/>
+          <a:lstStyle/>
+          <a:p>
+            <a:r>
+              <a:rPr lang="de-DE" dirty="0" smtClean="0"/>
+              <a:t>Studienaufbau – Charakteristika</a:t>
+            </a:r>
+            <a:endParaRPr lang="de-DE" dirty="0"/>
+          </a:p>
+        </p:txBody>
+      </p:sp>
+      <p:sp>
+        <p:nvSpPr>
+          <p:cNvPr id="3" name="Inhaltsplatzhalter 2"/>
+          <p:cNvSpPr>
+            <a:spLocks noGrp="1"/>
+          </p:cNvSpPr>
+          <p:nvPr>
+            <p:ph idx="1"/>
+          </p:nvPr>
+        </p:nvSpPr>
+        <p:spPr/>
+        <p:txBody>
+          <a:bodyPr/>
+          <a:lstStyle/>
+          <a:p>
+            <a:r>
+              <a:rPr lang="de-DE" dirty="0" smtClean="0"/>
+              <a:t>Prospektive </a:t>
+            </a:r>
+            <a:r>
+              <a:rPr lang="de-DE" dirty="0" err="1" smtClean="0"/>
+              <a:t>Kohortenstudie</a:t>
+            </a:r>
+            <a:endParaRPr lang="de-DE" dirty="0" smtClean="0"/>
+          </a:p>
+          <a:p>
+            <a:r>
+              <a:rPr lang="de-DE" dirty="0" smtClean="0"/>
+              <a:t>Randomisiert</a:t>
+            </a:r>
+          </a:p>
+          <a:p>
+            <a:r>
+              <a:rPr lang="de-DE" dirty="0" smtClean="0"/>
+              <a:t>Teilnehmer: 200.000 Männer und Frauen</a:t>
+            </a:r>
+          </a:p>
+          <a:p>
+            <a:r>
+              <a:rPr lang="de-DE" dirty="0" smtClean="0"/>
+              <a:t>Alter: 20 – 69 Jahre</a:t>
+            </a:r>
+          </a:p>
+          <a:p>
+            <a:r>
+              <a:rPr lang="de-DE" dirty="0" smtClean="0"/>
+              <a:t>Dauer: 20 – 30 Jahre</a:t>
+            </a:r>
+          </a:p>
+        </p:txBody>
+      </p:sp>
+      <p:sp>
+        <p:nvSpPr>
+          <p:cNvPr id="4" name="Fußzeilenplatzhalter 3"/>
+          <p:cNvSpPr>
+            <a:spLocks noGrp="1"/>
+          </p:cNvSpPr>
+          <p:nvPr>
+            <p:ph type="ftr" sz="quarter" idx="11"/>
+          </p:nvPr>
+        </p:nvSpPr>
+        <p:spPr/>
+        <p:txBody>
+          <a:bodyPr/>
+          <a:lstStyle/>
+          <a:p>
+            <a:r>
+              <a:rPr lang="en-US" smtClean="0"/>
+              <a:t>| Dominik Meixner | Dominique Cheray |</a:t>
+            </a:r>
+            <a:endParaRPr lang="en-US" dirty="0"/>
+          </a:p>
+        </p:txBody>
+      </p:sp>
+    </p:spTree>
+    <p:extLst>
+      <p:ext uri="{BB962C8B-B14F-4D97-AF65-F5344CB8AC3E}">
+        <p14:creationId xmlns:p14="http://schemas.microsoft.com/office/powerpoint/2010/main" val="4260189821"/>
+      </p:ext>
+    </p:extLst>
+  </p:cSld>
+  <p:clrMapOvr>
+    <a:masterClrMapping/>
+  </p:clrMapOvr>
+</p:sld>
+</file>
+
+<file path=ppt/slides/slide14.xml><?xml version="1.0" encoding="utf-8"?>
+<p:sld xmlns:a="http://schemas.openxmlformats.org/drawingml/2006/main" xmlns:r="http://schemas.openxmlformats.org/officeDocument/2006/relationships" xmlns:p="http://schemas.openxmlformats.org/presentationml/2006/main">
+  <p:cSld>
+    <p:spTree>
+      <p:nvGrpSpPr>
+        <p:cNvPr id="1" name=""/>
+        <p:cNvGrpSpPr/>
+        <p:nvPr/>
+      </p:nvGrpSpPr>
+      <p:grpSpPr>
+        <a:xfrm>
+          <a:off x="0" y="0"/>
+          <a:ext cx="0" cy="0"/>
+          <a:chOff x="0" y="0"/>
+          <a:chExt cx="0" cy="0"/>
+        </a:xfrm>
+      </p:grpSpPr>
+      <p:sp>
+        <p:nvSpPr>
+          <p:cNvPr id="2" name="Titel 1"/>
+          <p:cNvSpPr>
+            <a:spLocks noGrp="1"/>
+          </p:cNvSpPr>
+          <p:nvPr>
+            <p:ph type="title"/>
+          </p:nvPr>
+        </p:nvSpPr>
+        <p:spPr/>
+        <p:txBody>
+          <a:bodyPr/>
+          <a:lstStyle/>
+          <a:p>
+            <a:r>
+              <a:rPr lang="de-DE" dirty="0"/>
+              <a:t>Studienaufbau – Charakteristika</a:t>
+            </a:r>
+          </a:p>
+        </p:txBody>
+      </p:sp>
+      <p:sp>
+        <p:nvSpPr>
+          <p:cNvPr id="3" name="Inhaltsplatzhalter 2"/>
+          <p:cNvSpPr>
+            <a:spLocks noGrp="1"/>
+          </p:cNvSpPr>
+          <p:nvPr>
+            <p:ph idx="1"/>
+          </p:nvPr>
+        </p:nvSpPr>
+        <p:spPr/>
+        <p:txBody>
+          <a:bodyPr/>
+          <a:lstStyle/>
+          <a:p>
+            <a:r>
+              <a:rPr lang="de-DE" dirty="0" smtClean="0"/>
+              <a:t>Basisuntersuchung</a:t>
+            </a:r>
+          </a:p>
+          <a:p>
+            <a:r>
+              <a:rPr lang="de-DE" dirty="0" smtClean="0"/>
+              <a:t>Folgeuntersuchung </a:t>
+            </a:r>
+            <a:r>
+              <a:rPr lang="de-DE" dirty="0"/>
+              <a:t>nach </a:t>
+            </a:r>
+            <a:br>
+              <a:rPr lang="de-DE" dirty="0"/>
+            </a:br>
+            <a:r>
+              <a:rPr lang="de-DE" dirty="0" smtClean="0"/>
+              <a:t>4-5 Jahren</a:t>
+            </a:r>
+          </a:p>
+          <a:p>
+            <a:r>
+              <a:rPr lang="de-DE" dirty="0" smtClean="0"/>
+              <a:t>Kombination aktiver und </a:t>
+            </a:r>
+            <a:br>
+              <a:rPr lang="de-DE" dirty="0" smtClean="0"/>
+            </a:br>
+            <a:r>
+              <a:rPr lang="de-DE" dirty="0" smtClean="0"/>
+              <a:t>passiver Nachbeobachtung</a:t>
+            </a:r>
+            <a:endParaRPr lang="de-DE" dirty="0"/>
+          </a:p>
+        </p:txBody>
+      </p:sp>
+      <p:sp>
+        <p:nvSpPr>
+          <p:cNvPr id="4" name="Fußzeilenplatzhalter 3"/>
+          <p:cNvSpPr>
+            <a:spLocks noGrp="1"/>
+          </p:cNvSpPr>
+          <p:nvPr>
+            <p:ph type="ftr" sz="quarter" idx="11"/>
+          </p:nvPr>
+        </p:nvSpPr>
+        <p:spPr/>
+        <p:txBody>
+          <a:bodyPr/>
+          <a:lstStyle/>
+          <a:p>
+            <a:r>
+              <a:rPr lang="en-US" smtClean="0"/>
+              <a:t>| Dominik Meixner | Dominique Cheray |</a:t>
+            </a:r>
+            <a:endParaRPr lang="en-US" dirty="0"/>
+          </a:p>
+        </p:txBody>
+      </p:sp>
+      <p:pic>
+        <p:nvPicPr>
+          <p:cNvPr id="5" name="Grafik 4"/>
+          <p:cNvPicPr>
+            <a:picLocks noChangeAspect="1"/>
+          </p:cNvPicPr>
+          <p:nvPr/>
+        </p:nvPicPr>
+        <p:blipFill>
+          <a:blip r:embed="rId3">
+            <a:extLst>
+              <a:ext uri="{BEBA8EAE-BF5A-486C-A8C5-ECC9F3942E4B}">
+                <a14:imgProps xmlns:a14="http://schemas.microsoft.com/office/drawing/2010/main">
+                  <a14:imgLayer r:embed="rId4">
+                    <a14:imgEffect>
+                      <a14:sharpenSoften amount="25000"/>
+                    </a14:imgEffect>
+                  </a14:imgLayer>
+                </a14:imgProps>
+              </a:ext>
+              <a:ext uri="{28A0092B-C50C-407E-A947-70E740481C1C}">
+                <a14:useLocalDpi xmlns:a14="http://schemas.microsoft.com/office/drawing/2010/main" val="0"/>
+              </a:ext>
+            </a:extLst>
+          </a:blip>
+          <a:stretch>
+            <a:fillRect/>
+          </a:stretch>
+        </p:blipFill>
+        <p:spPr>
+          <a:xfrm>
+            <a:off x="5453992" y="2025354"/>
+            <a:ext cx="5670856" cy="2708304"/>
+          </a:xfrm>
+          <a:prstGeom prst="rect">
+            <a:avLst/>
+          </a:prstGeom>
+        </p:spPr>
+      </p:pic>
+      <p:sp>
+        <p:nvSpPr>
+          <p:cNvPr id="6" name="Textfeld 5"/>
+          <p:cNvSpPr txBox="1"/>
+          <p:nvPr/>
+        </p:nvSpPr>
+        <p:spPr>
+          <a:xfrm>
+            <a:off x="5964964" y="4733657"/>
+            <a:ext cx="4648913" cy="246221"/>
+          </a:xfrm>
+          <a:prstGeom prst="rect">
+            <a:avLst/>
+          </a:prstGeom>
+          <a:noFill/>
+        </p:spPr>
+        <p:txBody>
+          <a:bodyPr wrap="square" rtlCol="0">
+            <a:spAutoFit/>
+          </a:bodyPr>
+          <a:lstStyle/>
+          <a:p>
+            <a:r>
+              <a:rPr lang="de-DE" sz="1000" dirty="0"/>
+              <a:t>http://www.nationale-kohorte.de/content/nationale-kohorte.pdf</a:t>
+            </a:r>
+          </a:p>
+        </p:txBody>
+      </p:sp>
+    </p:spTree>
+    <p:extLst>
+      <p:ext uri="{BB962C8B-B14F-4D97-AF65-F5344CB8AC3E}">
+        <p14:creationId xmlns:p14="http://schemas.microsoft.com/office/powerpoint/2010/main" val="3487651324"/>
+      </p:ext>
+    </p:extLst>
+  </p:cSld>
+  <p:clrMapOvr>
+    <a:masterClrMapping/>
+  </p:clrMapOvr>
+</p:sld>
+</file>
+
+<file path=ppt/slides/slide15.xml><?xml version="1.0" encoding="utf-8"?>
+<p:sld xmlns:a="http://schemas.openxmlformats.org/drawingml/2006/main" xmlns:r="http://schemas.openxmlformats.org/officeDocument/2006/relationships" xmlns:p="http://schemas.openxmlformats.org/presentationml/2006/main">
+  <p:cSld>
+    <p:spTree>
+      <p:nvGrpSpPr>
+        <p:cNvPr id="1" name=""/>
+        <p:cNvGrpSpPr/>
+        <p:nvPr/>
+      </p:nvGrpSpPr>
+      <p:grpSpPr>
+        <a:xfrm>
+          <a:off x="0" y="0"/>
+          <a:ext cx="0" cy="0"/>
+          <a:chOff x="0" y="0"/>
+          <a:chExt cx="0" cy="0"/>
+        </a:xfrm>
+      </p:grpSpPr>
+      <p:sp>
+        <p:nvSpPr>
+          <p:cNvPr id="2" name="Titel 1"/>
+          <p:cNvSpPr>
+            <a:spLocks noGrp="1"/>
+          </p:cNvSpPr>
+          <p:nvPr>
+            <p:ph type="title"/>
+          </p:nvPr>
+        </p:nvSpPr>
+        <p:spPr/>
+        <p:txBody>
+          <a:bodyPr>
+            <a:noAutofit/>
+          </a:bodyPr>
+          <a:lstStyle/>
+          <a:p>
+            <a:r>
+              <a:rPr lang="de-DE" dirty="0" smtClean="0"/>
+              <a:t>Studienaufbau - Untersuchungsmodule</a:t>
+            </a:r>
+            <a:endParaRPr lang="de-DE" dirty="0"/>
+          </a:p>
+        </p:txBody>
+      </p:sp>
+      <p:sp>
+        <p:nvSpPr>
+          <p:cNvPr id="3" name="Inhaltsplatzhalter 2"/>
+          <p:cNvSpPr>
+            <a:spLocks noGrp="1"/>
+          </p:cNvSpPr>
+          <p:nvPr>
+            <p:ph idx="1"/>
+          </p:nvPr>
+        </p:nvSpPr>
+        <p:spPr/>
+        <p:txBody>
+          <a:bodyPr/>
+          <a:lstStyle/>
+          <a:p>
+            <a:r>
+              <a:rPr lang="de-DE" dirty="0" smtClean="0"/>
+              <a:t>Herz-Kreislauf-System</a:t>
+            </a:r>
+          </a:p>
+          <a:p>
+            <a:r>
+              <a:rPr lang="de-DE" dirty="0" smtClean="0"/>
+              <a:t>Diabetes</a:t>
+            </a:r>
+          </a:p>
+          <a:p>
+            <a:r>
+              <a:rPr lang="de-DE" dirty="0" smtClean="0"/>
+              <a:t>Kognitive Funktion</a:t>
+            </a:r>
+          </a:p>
+          <a:p>
+            <a:r>
+              <a:rPr lang="de-DE" dirty="0" smtClean="0"/>
+              <a:t>Lungenfunktion</a:t>
+            </a:r>
+          </a:p>
+          <a:p>
+            <a:r>
+              <a:rPr lang="de-DE" dirty="0" smtClean="0"/>
+              <a:t>Muskel-Skelett-System</a:t>
+            </a:r>
+          </a:p>
+          <a:p>
+            <a:r>
+              <a:rPr lang="de-DE" dirty="0" smtClean="0"/>
+              <a:t>Mundgesundheit</a:t>
+            </a:r>
+          </a:p>
+          <a:p>
+            <a:r>
+              <a:rPr lang="de-DE" dirty="0" smtClean="0"/>
+              <a:t>Sinnesorgane</a:t>
+            </a:r>
+            <a:endParaRPr lang="de-DE" dirty="0"/>
+          </a:p>
+        </p:txBody>
+      </p:sp>
+      <p:sp>
+        <p:nvSpPr>
+          <p:cNvPr id="4" name="Fußzeilenplatzhalter 3"/>
+          <p:cNvSpPr>
+            <a:spLocks noGrp="1"/>
+          </p:cNvSpPr>
+          <p:nvPr>
+            <p:ph type="ftr" sz="quarter" idx="11"/>
+          </p:nvPr>
+        </p:nvSpPr>
+        <p:spPr/>
+        <p:txBody>
+          <a:bodyPr/>
+          <a:lstStyle/>
+          <a:p>
+            <a:r>
+              <a:rPr lang="en-US" smtClean="0"/>
+              <a:t>| Dominik Meixner | Dominique Cheray |</a:t>
+            </a:r>
+            <a:endParaRPr lang="en-US" dirty="0"/>
+          </a:p>
+        </p:txBody>
+      </p:sp>
+    </p:spTree>
+    <p:extLst>
+      <p:ext uri="{BB962C8B-B14F-4D97-AF65-F5344CB8AC3E}">
+        <p14:creationId xmlns:p14="http://schemas.microsoft.com/office/powerpoint/2010/main" val="3117971425"/>
+      </p:ext>
+    </p:extLst>
+  </p:cSld>
+  <p:clrMapOvr>
+    <a:masterClrMapping/>
+  </p:clrMapOvr>
+</p:sld>
+</file>
+
+<file path=ppt/slides/slide16.xml><?xml version="1.0" encoding="utf-8"?>
+<p:sld xmlns:a="http://schemas.openxmlformats.org/drawingml/2006/main" xmlns:r="http://schemas.openxmlformats.org/officeDocument/2006/relationships" xmlns:p="http://schemas.openxmlformats.org/presentationml/2006/main">
+  <p:cSld>
+    <p:spTree>
+      <p:nvGrpSpPr>
+        <p:cNvPr id="1" name=""/>
+        <p:cNvGrpSpPr/>
+        <p:nvPr/>
+      </p:nvGrpSpPr>
+      <p:grpSpPr>
+        <a:xfrm>
+          <a:off x="0" y="0"/>
+          <a:ext cx="0" cy="0"/>
+          <a:chOff x="0" y="0"/>
+          <a:chExt cx="0" cy="0"/>
+        </a:xfrm>
+      </p:grpSpPr>
+      <p:sp>
+        <p:nvSpPr>
+          <p:cNvPr id="2" name="Titel 1"/>
+          <p:cNvSpPr>
+            <a:spLocks noGrp="1"/>
+          </p:cNvSpPr>
+          <p:nvPr>
+            <p:ph type="title"/>
+          </p:nvPr>
+        </p:nvSpPr>
+        <p:spPr/>
+        <p:txBody>
+          <a:bodyPr>
+            <a:noAutofit/>
+          </a:bodyPr>
+          <a:lstStyle/>
+          <a:p>
+            <a:r>
+              <a:rPr lang="de-DE" dirty="0"/>
+              <a:t>Studienaufbau - Untersuchungsmodule</a:t>
+            </a:r>
+          </a:p>
+        </p:txBody>
+      </p:sp>
+      <p:sp>
+        <p:nvSpPr>
+          <p:cNvPr id="3" name="Inhaltsplatzhalter 2"/>
+          <p:cNvSpPr>
+            <a:spLocks noGrp="1"/>
+          </p:cNvSpPr>
+          <p:nvPr>
+            <p:ph idx="1"/>
+          </p:nvPr>
+        </p:nvSpPr>
+        <p:spPr/>
+        <p:txBody>
+          <a:bodyPr/>
+          <a:lstStyle/>
+          <a:p>
+            <a:r>
+              <a:rPr lang="de-DE" dirty="0" smtClean="0"/>
+              <a:t>Körperliche Aktivität und Fitness</a:t>
+            </a:r>
+          </a:p>
+          <a:p>
+            <a:r>
+              <a:rPr lang="de-DE" dirty="0" smtClean="0"/>
+              <a:t>Anthropometrie</a:t>
+            </a:r>
+          </a:p>
+          <a:p>
+            <a:r>
+              <a:rPr lang="de-DE" dirty="0" smtClean="0"/>
+              <a:t>MRT-Untersuchung</a:t>
+            </a:r>
+          </a:p>
+          <a:p>
+            <a:r>
+              <a:rPr lang="de-DE" dirty="0" smtClean="0"/>
+              <a:t>Ultraschall des Herzens</a:t>
+            </a:r>
+            <a:endParaRPr lang="de-DE" dirty="0"/>
+          </a:p>
+          <a:p>
+            <a:r>
+              <a:rPr lang="de-DE" dirty="0" smtClean="0"/>
+              <a:t>Sammlung von Bioproben</a:t>
+            </a:r>
+          </a:p>
+          <a:p>
+            <a:r>
+              <a:rPr lang="de-DE" dirty="0" smtClean="0"/>
+              <a:t>Befragung zu sozioökonomischen Faktoren, Gesundheit und Lebensstil</a:t>
+            </a:r>
+            <a:endParaRPr lang="de-DE" dirty="0"/>
+          </a:p>
+        </p:txBody>
+      </p:sp>
+      <p:sp>
+        <p:nvSpPr>
+          <p:cNvPr id="4" name="Fußzeilenplatzhalter 3"/>
+          <p:cNvSpPr>
+            <a:spLocks noGrp="1"/>
+          </p:cNvSpPr>
+          <p:nvPr>
+            <p:ph type="ftr" sz="quarter" idx="11"/>
+          </p:nvPr>
+        </p:nvSpPr>
+        <p:spPr/>
+        <p:txBody>
+          <a:bodyPr/>
+          <a:lstStyle/>
+          <a:p>
+            <a:r>
+              <a:rPr lang="en-US" smtClean="0"/>
+              <a:t>| Dominik Meixner | Dominique Cheray |</a:t>
+            </a:r>
+            <a:endParaRPr lang="en-US" dirty="0"/>
+          </a:p>
+        </p:txBody>
+      </p:sp>
+    </p:spTree>
+    <p:extLst>
+      <p:ext uri="{BB962C8B-B14F-4D97-AF65-F5344CB8AC3E}">
+        <p14:creationId xmlns:p14="http://schemas.microsoft.com/office/powerpoint/2010/main" val="381225604"/>
+      </p:ext>
+    </p:extLst>
+  </p:cSld>
+  <p:clrMapOvr>
+    <a:masterClrMapping/>
+  </p:clrMapOvr>
+</p:sld>
+</file>
+
+<file path=ppt/slides/slide17.xml><?xml version="1.0" encoding="utf-8"?>
+<p:sld xmlns:a="http://schemas.openxmlformats.org/drawingml/2006/main" xmlns:r="http://schemas.openxmlformats.org/officeDocument/2006/relationships" xmlns:p="http://schemas.openxmlformats.org/presentationml/2006/main">
+  <p:cSld>
+    <p:spTree>
+      <p:nvGrpSpPr>
+        <p:cNvPr id="1" name=""/>
+        <p:cNvGrpSpPr/>
+        <p:nvPr/>
+      </p:nvGrpSpPr>
+      <p:grpSpPr>
+        <a:xfrm>
+          <a:off x="0" y="0"/>
+          <a:ext cx="0" cy="0"/>
+          <a:chOff x="0" y="0"/>
+          <a:chExt cx="0" cy="0"/>
+        </a:xfrm>
+      </p:grpSpPr>
+      <p:sp>
+        <p:nvSpPr>
+          <p:cNvPr id="2" name="Titel 1"/>
+          <p:cNvSpPr>
+            <a:spLocks noGrp="1"/>
+          </p:cNvSpPr>
+          <p:nvPr>
+            <p:ph type="title"/>
+          </p:nvPr>
+        </p:nvSpPr>
+        <p:spPr/>
+        <p:txBody>
+          <a:bodyPr/>
+          <a:lstStyle/>
+          <a:p>
+            <a:r>
+              <a:rPr lang="de-DE" dirty="0" smtClean="0"/>
+              <a:t>Rechtliche Aspekte</a:t>
+            </a:r>
+            <a:endParaRPr lang="de-DE" dirty="0"/>
+          </a:p>
+        </p:txBody>
+      </p:sp>
+      <p:sp>
+        <p:nvSpPr>
+          <p:cNvPr id="3" name="Textplatzhalter 2"/>
+          <p:cNvSpPr>
+            <a:spLocks noGrp="1"/>
+          </p:cNvSpPr>
+          <p:nvPr>
+            <p:ph type="body" idx="1"/>
+          </p:nvPr>
+        </p:nvSpPr>
+        <p:spPr/>
+        <p:txBody>
+          <a:bodyPr/>
+          <a:lstStyle/>
+          <a:p>
+            <a:endParaRPr lang="de-DE"/>
+          </a:p>
+        </p:txBody>
+      </p:sp>
+      <p:sp>
+        <p:nvSpPr>
+          <p:cNvPr id="4" name="Fußzeilenplatzhalter 3"/>
+          <p:cNvSpPr>
+            <a:spLocks noGrp="1"/>
+          </p:cNvSpPr>
+          <p:nvPr>
+            <p:ph type="ftr" sz="quarter" idx="11"/>
+          </p:nvPr>
+        </p:nvSpPr>
+        <p:spPr/>
+        <p:txBody>
+          <a:bodyPr/>
+          <a:lstStyle/>
+          <a:p>
+            <a:r>
+              <a:rPr lang="en-US" smtClean="0"/>
+              <a:t>| Dominik Meixner | Dominique Cheray |</a:t>
+            </a:r>
+            <a:endParaRPr lang="en-US" dirty="0"/>
+          </a:p>
+        </p:txBody>
+      </p:sp>
+      <p:pic>
+        <p:nvPicPr>
+          <p:cNvPr id="5" name="Grafik 4"/>
+          <p:cNvPicPr>
+            <a:picLocks noChangeAspect="1"/>
+          </p:cNvPicPr>
+          <p:nvPr/>
+        </p:nvPicPr>
+        <p:blipFill>
+          <a:blip r:embed="rId2">
+            <a:extLst>
+              <a:ext uri="{28A0092B-C50C-407E-A947-70E740481C1C}">
+                <a14:useLocalDpi xmlns:a14="http://schemas.microsoft.com/office/drawing/2010/main" val="0"/>
+              </a:ext>
+            </a:extLst>
+          </a:blip>
+          <a:stretch>
+            <a:fillRect/>
+          </a:stretch>
+        </p:blipFill>
+        <p:spPr>
+          <a:xfrm>
+            <a:off x="6646586" y="683663"/>
+            <a:ext cx="1838582" cy="1724266"/>
+          </a:xfrm>
+          <a:prstGeom prst="rect">
+            <a:avLst/>
+          </a:prstGeom>
+        </p:spPr>
+      </p:pic>
+    </p:spTree>
+    <p:extLst>
+      <p:ext uri="{BB962C8B-B14F-4D97-AF65-F5344CB8AC3E}">
+        <p14:creationId xmlns:p14="http://schemas.microsoft.com/office/powerpoint/2010/main" val="1936364652"/>
+      </p:ext>
+    </p:extLst>
+  </p:cSld>
+  <p:clrMapOvr>
+    <a:masterClrMapping/>
+  </p:clrMapOvr>
+</p:sld>
+</file>
+
+<file path=ppt/slides/slide18.xml><?xml version="1.0" encoding="utf-8"?>
+<p:sld xmlns:a="http://schemas.openxmlformats.org/drawingml/2006/main" xmlns:r="http://schemas.openxmlformats.org/officeDocument/2006/relationships" xmlns:p="http://schemas.openxmlformats.org/presentationml/2006/main">
+  <p:cSld>
+    <p:spTree>
+      <p:nvGrpSpPr>
+        <p:cNvPr id="1" name=""/>
+        <p:cNvGrpSpPr/>
+        <p:nvPr/>
+      </p:nvGrpSpPr>
+      <p:grpSpPr>
+        <a:xfrm>
+          <a:off x="0" y="0"/>
+          <a:ext cx="0" cy="0"/>
+          <a:chOff x="0" y="0"/>
+          <a:chExt cx="0" cy="0"/>
+        </a:xfrm>
+      </p:grpSpPr>
+      <p:sp>
+        <p:nvSpPr>
+          <p:cNvPr id="2" name="Titel 1"/>
+          <p:cNvSpPr>
+            <a:spLocks noGrp="1"/>
+          </p:cNvSpPr>
+          <p:nvPr>
+            <p:ph type="title"/>
+          </p:nvPr>
+        </p:nvSpPr>
+        <p:spPr/>
+        <p:txBody>
+          <a:bodyPr/>
+          <a:lstStyle/>
+          <a:p>
+            <a:r>
+              <a:rPr lang="de-DE" dirty="0" smtClean="0"/>
+              <a:t>Rechtliche Aspekte - Freiwilligkeit</a:t>
+            </a:r>
+            <a:endParaRPr lang="de-DE" dirty="0"/>
+          </a:p>
+        </p:txBody>
+      </p:sp>
+      <p:sp>
+        <p:nvSpPr>
+          <p:cNvPr id="3" name="Inhaltsplatzhalter 2"/>
+          <p:cNvSpPr>
+            <a:spLocks noGrp="1"/>
+          </p:cNvSpPr>
+          <p:nvPr>
+            <p:ph idx="1"/>
+          </p:nvPr>
+        </p:nvSpPr>
+        <p:spPr/>
+        <p:txBody>
+          <a:bodyPr/>
+          <a:lstStyle/>
+          <a:p>
+            <a:r>
+              <a:rPr lang="de-DE" dirty="0" smtClean="0"/>
+              <a:t>Freiwillige Studienteilnahme</a:t>
+            </a:r>
+          </a:p>
+          <a:p>
+            <a:r>
+              <a:rPr lang="de-DE" dirty="0" smtClean="0"/>
+              <a:t>Teilnahme jederzeit widerrufbar</a:t>
+            </a:r>
+            <a:endParaRPr lang="de-DE" dirty="0"/>
+          </a:p>
+        </p:txBody>
+      </p:sp>
+      <p:sp>
+        <p:nvSpPr>
+          <p:cNvPr id="4" name="Fußzeilenplatzhalter 3"/>
+          <p:cNvSpPr>
+            <a:spLocks noGrp="1"/>
+          </p:cNvSpPr>
+          <p:nvPr>
+            <p:ph type="ftr" sz="quarter" idx="11"/>
+          </p:nvPr>
+        </p:nvSpPr>
+        <p:spPr/>
+        <p:txBody>
+          <a:bodyPr/>
+          <a:lstStyle/>
+          <a:p>
+            <a:r>
+              <a:rPr lang="en-US" smtClean="0"/>
+              <a:t>| Dominik Meixner | Dominique Cheray |</a:t>
+            </a:r>
+            <a:endParaRPr lang="en-US" dirty="0"/>
+          </a:p>
+        </p:txBody>
+      </p:sp>
+    </p:spTree>
+    <p:extLst>
+      <p:ext uri="{BB962C8B-B14F-4D97-AF65-F5344CB8AC3E}">
+        <p14:creationId xmlns:p14="http://schemas.microsoft.com/office/powerpoint/2010/main" val="755049033"/>
+      </p:ext>
+    </p:extLst>
+  </p:cSld>
+  <p:clrMapOvr>
+    <a:masterClrMapping/>
+  </p:clrMapOvr>
+</p:sld>
+</file>
+
+<file path=ppt/slides/slide19.xml><?xml version="1.0" encoding="utf-8"?>
+<p:sld xmlns:a="http://schemas.openxmlformats.org/drawingml/2006/main" xmlns:r="http://schemas.openxmlformats.org/officeDocument/2006/relationships" xmlns:p="http://schemas.openxmlformats.org/presentationml/2006/main">
+  <p:cSld>
+    <p:spTree>
+      <p:nvGrpSpPr>
+        <p:cNvPr id="1" name=""/>
+        <p:cNvGrpSpPr/>
+        <p:nvPr/>
+      </p:nvGrpSpPr>
+      <p:grpSpPr>
+        <a:xfrm>
+          <a:off x="0" y="0"/>
+          <a:ext cx="0" cy="0"/>
+          <a:chOff x="0" y="0"/>
+          <a:chExt cx="0" cy="0"/>
+        </a:xfrm>
+      </p:grpSpPr>
+      <p:sp>
+        <p:nvSpPr>
+          <p:cNvPr id="2" name="Titel 1"/>
+          <p:cNvSpPr>
+            <a:spLocks noGrp="1"/>
+          </p:cNvSpPr>
+          <p:nvPr>
+            <p:ph type="title"/>
+          </p:nvPr>
+        </p:nvSpPr>
+        <p:spPr/>
+        <p:txBody>
+          <a:bodyPr>
+            <a:noAutofit/>
+          </a:bodyPr>
+          <a:lstStyle/>
+          <a:p>
+            <a:r>
+              <a:rPr lang="de-DE" dirty="0" smtClean="0"/>
+              <a:t>Rechtliche Aspekte – Recht auf Nichtwissen</a:t>
+            </a:r>
+            <a:endParaRPr lang="de-DE" dirty="0"/>
+          </a:p>
+        </p:txBody>
+      </p:sp>
+      <p:sp>
+        <p:nvSpPr>
+          <p:cNvPr id="3" name="Inhaltsplatzhalter 2"/>
+          <p:cNvSpPr>
+            <a:spLocks noGrp="1"/>
+          </p:cNvSpPr>
+          <p:nvPr>
+            <p:ph idx="1"/>
+          </p:nvPr>
+        </p:nvSpPr>
+        <p:spPr/>
+        <p:txBody>
+          <a:bodyPr/>
+          <a:lstStyle/>
+          <a:p>
+            <a:r>
+              <a:rPr lang="de-DE" dirty="0" smtClean="0"/>
+              <a:t>Teilnehmer entscheidet vor Studienteilnahme ob er über die Untersuchungsergebnisse informiert werden möchte</a:t>
+            </a:r>
+            <a:endParaRPr lang="de-DE" dirty="0"/>
+          </a:p>
+        </p:txBody>
+      </p:sp>
+      <p:sp>
+        <p:nvSpPr>
+          <p:cNvPr id="4" name="Fußzeilenplatzhalter 3"/>
+          <p:cNvSpPr>
+            <a:spLocks noGrp="1"/>
+          </p:cNvSpPr>
+          <p:nvPr>
+            <p:ph type="ftr" sz="quarter" idx="11"/>
+          </p:nvPr>
+        </p:nvSpPr>
+        <p:spPr/>
+        <p:txBody>
+          <a:bodyPr/>
+          <a:lstStyle/>
+          <a:p>
+            <a:r>
+              <a:rPr lang="en-US" smtClean="0"/>
+              <a:t>| Dominik Meixner | Dominique Cheray |</a:t>
+            </a:r>
+            <a:endParaRPr lang="en-US" dirty="0"/>
+          </a:p>
+        </p:txBody>
+      </p:sp>
+    </p:spTree>
+    <p:extLst>
+      <p:ext uri="{BB962C8B-B14F-4D97-AF65-F5344CB8AC3E}">
+        <p14:creationId xmlns:p14="http://schemas.microsoft.com/office/powerpoint/2010/main" val="3812788204"/>
+      </p:ext>
+    </p:extLst>
+  </p:cSld>
+  <p:clrMapOvr>
+    <a:masterClrMapping/>
+  </p:clrMapOvr>
+</p:sld>
+</file>
+
 <file path=ppt/slides/slide2.xml><?xml version="1.0" encoding="utf-8"?>
 <p:sld xmlns:a="http://schemas.openxmlformats.org/drawingml/2006/main" xmlns:r="http://schemas.openxmlformats.org/officeDocument/2006/relationships" xmlns:p="http://schemas.openxmlformats.org/presentationml/2006/main">
   <p:cSld>
@@ -6817,6 +9649,538 @@
 </p:sld>
 </file>
 
+<file path=ppt/slides/slide20.xml><?xml version="1.0" encoding="utf-8"?>
+<p:sld xmlns:a="http://schemas.openxmlformats.org/drawingml/2006/main" xmlns:r="http://schemas.openxmlformats.org/officeDocument/2006/relationships" xmlns:p="http://schemas.openxmlformats.org/presentationml/2006/main">
+  <p:cSld>
+    <p:spTree>
+      <p:nvGrpSpPr>
+        <p:cNvPr id="1" name=""/>
+        <p:cNvGrpSpPr/>
+        <p:nvPr/>
+      </p:nvGrpSpPr>
+      <p:grpSpPr>
+        <a:xfrm>
+          <a:off x="0" y="0"/>
+          <a:ext cx="0" cy="0"/>
+          <a:chOff x="0" y="0"/>
+          <a:chExt cx="0" cy="0"/>
+        </a:xfrm>
+      </p:grpSpPr>
+      <p:sp>
+        <p:nvSpPr>
+          <p:cNvPr id="2" name="Titel 1"/>
+          <p:cNvSpPr>
+            <a:spLocks noGrp="1"/>
+          </p:cNvSpPr>
+          <p:nvPr>
+            <p:ph type="title"/>
+          </p:nvPr>
+        </p:nvSpPr>
+        <p:spPr/>
+        <p:txBody>
+          <a:bodyPr/>
+          <a:lstStyle/>
+          <a:p>
+            <a:r>
+              <a:rPr lang="de-DE" dirty="0" smtClean="0"/>
+              <a:t>Rechtliche Aspekte – Ethik Kodex </a:t>
+            </a:r>
+            <a:endParaRPr lang="de-DE" dirty="0"/>
+          </a:p>
+        </p:txBody>
+      </p:sp>
+      <p:sp>
+        <p:nvSpPr>
+          <p:cNvPr id="3" name="Inhaltsplatzhalter 2"/>
+          <p:cNvSpPr>
+            <a:spLocks noGrp="1"/>
+          </p:cNvSpPr>
+          <p:nvPr>
+            <p:ph idx="1"/>
+          </p:nvPr>
+        </p:nvSpPr>
+        <p:spPr/>
+        <p:txBody>
+          <a:bodyPr/>
+          <a:lstStyle/>
+          <a:p>
+            <a:r>
+              <a:rPr lang="de-DE" dirty="0" smtClean="0"/>
+              <a:t>Hohes Schutzniveau zugunsten der Teilnehmer</a:t>
+            </a:r>
+          </a:p>
+          <a:p>
+            <a:r>
+              <a:rPr lang="de-DE" dirty="0" smtClean="0"/>
+              <a:t>Wahrung der Prinzipien der guten wissenschaftlichen Praxis</a:t>
+            </a:r>
+          </a:p>
+          <a:p>
+            <a:r>
+              <a:rPr lang="de-DE" dirty="0" smtClean="0"/>
+              <a:t>Unabhängiger Beirat überwacht Einhaltung der ethischen Standards</a:t>
+            </a:r>
+            <a:endParaRPr lang="de-DE" dirty="0"/>
+          </a:p>
+        </p:txBody>
+      </p:sp>
+      <p:sp>
+        <p:nvSpPr>
+          <p:cNvPr id="4" name="Fußzeilenplatzhalter 3"/>
+          <p:cNvSpPr>
+            <a:spLocks noGrp="1"/>
+          </p:cNvSpPr>
+          <p:nvPr>
+            <p:ph type="ftr" sz="quarter" idx="11"/>
+          </p:nvPr>
+        </p:nvSpPr>
+        <p:spPr/>
+        <p:txBody>
+          <a:bodyPr/>
+          <a:lstStyle/>
+          <a:p>
+            <a:r>
+              <a:rPr lang="en-US" smtClean="0"/>
+              <a:t>| Dominik Meixner | Dominique Cheray |</a:t>
+            </a:r>
+            <a:endParaRPr lang="en-US" dirty="0"/>
+          </a:p>
+        </p:txBody>
+      </p:sp>
+    </p:spTree>
+    <p:extLst>
+      <p:ext uri="{BB962C8B-B14F-4D97-AF65-F5344CB8AC3E}">
+        <p14:creationId xmlns:p14="http://schemas.microsoft.com/office/powerpoint/2010/main" val="3061972887"/>
+      </p:ext>
+    </p:extLst>
+  </p:cSld>
+  <p:clrMapOvr>
+    <a:masterClrMapping/>
+  </p:clrMapOvr>
+</p:sld>
+</file>
+
+<file path=ppt/slides/slide21.xml><?xml version="1.0" encoding="utf-8"?>
+<p:sld xmlns:a="http://schemas.openxmlformats.org/drawingml/2006/main" xmlns:r="http://schemas.openxmlformats.org/officeDocument/2006/relationships" xmlns:p="http://schemas.openxmlformats.org/presentationml/2006/main">
+  <p:cSld>
+    <p:spTree>
+      <p:nvGrpSpPr>
+        <p:cNvPr id="1" name=""/>
+        <p:cNvGrpSpPr/>
+        <p:nvPr/>
+      </p:nvGrpSpPr>
+      <p:grpSpPr>
+        <a:xfrm>
+          <a:off x="0" y="0"/>
+          <a:ext cx="0" cy="0"/>
+          <a:chOff x="0" y="0"/>
+          <a:chExt cx="0" cy="0"/>
+        </a:xfrm>
+      </p:grpSpPr>
+      <p:sp>
+        <p:nvSpPr>
+          <p:cNvPr id="2" name="Titel 1"/>
+          <p:cNvSpPr>
+            <a:spLocks noGrp="1"/>
+          </p:cNvSpPr>
+          <p:nvPr>
+            <p:ph type="title"/>
+          </p:nvPr>
+        </p:nvSpPr>
+        <p:spPr/>
+        <p:txBody>
+          <a:bodyPr>
+            <a:noAutofit/>
+          </a:bodyPr>
+          <a:lstStyle/>
+          <a:p>
+            <a:r>
+              <a:rPr lang="de-DE" dirty="0" smtClean="0"/>
+              <a:t>Rechtliche Aspekte – </a:t>
+            </a:r>
+            <a:r>
+              <a:rPr lang="de-DE" dirty="0" err="1" smtClean="0"/>
+              <a:t>Datenschutzbestimmmungen</a:t>
+            </a:r>
+            <a:r>
+              <a:rPr lang="de-DE" dirty="0" smtClean="0"/>
+              <a:t> und IT- Sicherheit</a:t>
+            </a:r>
+            <a:endParaRPr lang="de-DE" dirty="0"/>
+          </a:p>
+        </p:txBody>
+      </p:sp>
+      <p:sp>
+        <p:nvSpPr>
+          <p:cNvPr id="3" name="Inhaltsplatzhalter 2"/>
+          <p:cNvSpPr>
+            <a:spLocks noGrp="1"/>
+          </p:cNvSpPr>
+          <p:nvPr>
+            <p:ph idx="1"/>
+          </p:nvPr>
+        </p:nvSpPr>
+        <p:spPr>
+          <a:xfrm>
+            <a:off x="677334" y="2555193"/>
+            <a:ext cx="8596668" cy="3486169"/>
+          </a:xfrm>
+        </p:spPr>
+        <p:txBody>
+          <a:bodyPr/>
+          <a:lstStyle/>
+          <a:p>
+            <a:pPr marL="342900" lvl="1" indent="-342900"/>
+            <a:r>
+              <a:rPr lang="de-DE" dirty="0" smtClean="0"/>
+              <a:t>keine </a:t>
+            </a:r>
+            <a:r>
+              <a:rPr lang="de-DE" dirty="0"/>
+              <a:t>Identifizierung der </a:t>
+            </a:r>
+            <a:r>
+              <a:rPr lang="de-DE" dirty="0" err="1" smtClean="0"/>
+              <a:t>StudienteilnehmerInnen</a:t>
+            </a:r>
+            <a:r>
+              <a:rPr lang="de-DE" dirty="0"/>
+              <a:t> </a:t>
+            </a:r>
+            <a:r>
+              <a:rPr lang="de-DE" dirty="0" smtClean="0"/>
+              <a:t>anhand </a:t>
+            </a:r>
+            <a:r>
+              <a:rPr lang="de-DE" dirty="0"/>
+              <a:t>der Studiendaten möglich</a:t>
+            </a:r>
+          </a:p>
+          <a:p>
+            <a:pPr marL="342900" lvl="1" indent="-342900"/>
+            <a:r>
+              <a:rPr lang="de-DE" dirty="0"/>
+              <a:t>ärztliche Schweigepflicht gewahrt </a:t>
+            </a:r>
+          </a:p>
+          <a:p>
+            <a:r>
+              <a:rPr lang="de-DE" dirty="0"/>
+              <a:t>Verwendung der Daten ausschließlich zu wissenschaftlichen Zwecken </a:t>
+            </a:r>
+            <a:endParaRPr lang="de-DE" dirty="0"/>
+          </a:p>
+        </p:txBody>
+      </p:sp>
+      <p:sp>
+        <p:nvSpPr>
+          <p:cNvPr id="4" name="Fußzeilenplatzhalter 3"/>
+          <p:cNvSpPr>
+            <a:spLocks noGrp="1"/>
+          </p:cNvSpPr>
+          <p:nvPr>
+            <p:ph type="ftr" sz="quarter" idx="11"/>
+          </p:nvPr>
+        </p:nvSpPr>
+        <p:spPr/>
+        <p:txBody>
+          <a:bodyPr/>
+          <a:lstStyle/>
+          <a:p>
+            <a:r>
+              <a:rPr lang="en-US" smtClean="0"/>
+              <a:t>| Dominik Meixner | Dominique Cheray |</a:t>
+            </a:r>
+            <a:endParaRPr lang="en-US" dirty="0"/>
+          </a:p>
+        </p:txBody>
+      </p:sp>
+    </p:spTree>
+    <p:extLst>
+      <p:ext uri="{BB962C8B-B14F-4D97-AF65-F5344CB8AC3E}">
+        <p14:creationId xmlns:p14="http://schemas.microsoft.com/office/powerpoint/2010/main" val="3215482943"/>
+      </p:ext>
+    </p:extLst>
+  </p:cSld>
+  <p:clrMapOvr>
+    <a:masterClrMapping/>
+  </p:clrMapOvr>
+</p:sld>
+</file>
+
+<file path=ppt/slides/slide22.xml><?xml version="1.0" encoding="utf-8"?>
+<p:sld xmlns:a="http://schemas.openxmlformats.org/drawingml/2006/main" xmlns:r="http://schemas.openxmlformats.org/officeDocument/2006/relationships" xmlns:p="http://schemas.openxmlformats.org/presentationml/2006/main">
+  <p:cSld>
+    <p:spTree>
+      <p:nvGrpSpPr>
+        <p:cNvPr id="1" name=""/>
+        <p:cNvGrpSpPr/>
+        <p:nvPr/>
+      </p:nvGrpSpPr>
+      <p:grpSpPr>
+        <a:xfrm>
+          <a:off x="0" y="0"/>
+          <a:ext cx="0" cy="0"/>
+          <a:chOff x="0" y="0"/>
+          <a:chExt cx="0" cy="0"/>
+        </a:xfrm>
+      </p:grpSpPr>
+      <p:sp>
+        <p:nvSpPr>
+          <p:cNvPr id="2" name="Titel 1"/>
+          <p:cNvSpPr>
+            <a:spLocks noGrp="1"/>
+          </p:cNvSpPr>
+          <p:nvPr>
+            <p:ph type="title"/>
+          </p:nvPr>
+        </p:nvSpPr>
+        <p:spPr/>
+        <p:txBody>
+          <a:bodyPr>
+            <a:noAutofit/>
+          </a:bodyPr>
+          <a:lstStyle/>
+          <a:p>
+            <a:r>
+              <a:rPr lang="de-DE" dirty="0" smtClean="0"/>
+              <a:t>Rechtliche Aspekte - Qualitätssicherung</a:t>
+            </a:r>
+            <a:endParaRPr lang="de-DE" dirty="0"/>
+          </a:p>
+        </p:txBody>
+      </p:sp>
+      <p:sp>
+        <p:nvSpPr>
+          <p:cNvPr id="3" name="Inhaltsplatzhalter 2"/>
+          <p:cNvSpPr>
+            <a:spLocks noGrp="1"/>
+          </p:cNvSpPr>
+          <p:nvPr>
+            <p:ph idx="1"/>
+          </p:nvPr>
+        </p:nvSpPr>
+        <p:spPr/>
+        <p:txBody>
+          <a:bodyPr/>
+          <a:lstStyle/>
+          <a:p>
+            <a:r>
+              <a:rPr lang="de-DE" dirty="0" smtClean="0"/>
+              <a:t>Durchführung der Untersuchungen und Befragungen anhand von wissenschaftlich festgelegten standardisierten Protokollen</a:t>
+            </a:r>
+            <a:endParaRPr lang="de-DE" dirty="0"/>
+          </a:p>
+        </p:txBody>
+      </p:sp>
+      <p:sp>
+        <p:nvSpPr>
+          <p:cNvPr id="4" name="Fußzeilenplatzhalter 3"/>
+          <p:cNvSpPr>
+            <a:spLocks noGrp="1"/>
+          </p:cNvSpPr>
+          <p:nvPr>
+            <p:ph type="ftr" sz="quarter" idx="11"/>
+          </p:nvPr>
+        </p:nvSpPr>
+        <p:spPr/>
+        <p:txBody>
+          <a:bodyPr/>
+          <a:lstStyle/>
+          <a:p>
+            <a:r>
+              <a:rPr lang="en-US" smtClean="0"/>
+              <a:t>| Dominik Meixner | Dominique Cheray |</a:t>
+            </a:r>
+            <a:endParaRPr lang="en-US" dirty="0"/>
+          </a:p>
+        </p:txBody>
+      </p:sp>
+    </p:spTree>
+    <p:extLst>
+      <p:ext uri="{BB962C8B-B14F-4D97-AF65-F5344CB8AC3E}">
+        <p14:creationId xmlns:p14="http://schemas.microsoft.com/office/powerpoint/2010/main" val="1237747868"/>
+      </p:ext>
+    </p:extLst>
+  </p:cSld>
+  <p:clrMapOvr>
+    <a:masterClrMapping/>
+  </p:clrMapOvr>
+</p:sld>
+</file>
+
+<file path=ppt/slides/slide23.xml><?xml version="1.0" encoding="utf-8"?>
+<p:sld xmlns:a="http://schemas.openxmlformats.org/drawingml/2006/main" xmlns:r="http://schemas.openxmlformats.org/officeDocument/2006/relationships" xmlns:p="http://schemas.openxmlformats.org/presentationml/2006/main">
+  <p:cSld>
+    <p:spTree>
+      <p:nvGrpSpPr>
+        <p:cNvPr id="1" name=""/>
+        <p:cNvGrpSpPr/>
+        <p:nvPr/>
+      </p:nvGrpSpPr>
+      <p:grpSpPr>
+        <a:xfrm>
+          <a:off x="0" y="0"/>
+          <a:ext cx="0" cy="0"/>
+          <a:chOff x="0" y="0"/>
+          <a:chExt cx="0" cy="0"/>
+        </a:xfrm>
+      </p:grpSpPr>
+      <p:pic>
+        <p:nvPicPr>
+          <p:cNvPr id="5" name="Picture 2" descr="https://r3sq.files.wordpress.com/2010/09/blutbild_2.jpg?w=460&amp;h=575"/>
+          <p:cNvPicPr>
+            <a:picLocks noChangeAspect="1" noChangeArrowheads="1"/>
+          </p:cNvPicPr>
+          <p:nvPr/>
+        </p:nvPicPr>
+        <p:blipFill>
+          <a:blip r:embed="rId2">
+            <a:extLst>
+              <a:ext uri="{28A0092B-C50C-407E-A947-70E740481C1C}">
+                <a14:useLocalDpi xmlns:a14="http://schemas.microsoft.com/office/drawing/2010/main" val="0"/>
+              </a:ext>
+            </a:extLst>
+          </a:blip>
+          <a:srcRect/>
+          <a:stretch>
+            <a:fillRect/>
+          </a:stretch>
+        </p:blipFill>
+        <p:spPr bwMode="auto">
+          <a:xfrm>
+            <a:off x="593853" y="924328"/>
+            <a:ext cx="4024540" cy="5039424"/>
+          </a:xfrm>
+          <a:prstGeom prst="rect">
+            <a:avLst/>
+          </a:prstGeom>
+          <a:noFill/>
+          <a:extLst>
+            <a:ext uri="{909E8E84-426E-40DD-AFC4-6F175D3DCCD1}">
+              <a14:hiddenFill xmlns:a14="http://schemas.microsoft.com/office/drawing/2010/main">
+                <a:solidFill>
+                  <a:srgbClr val="FFFFFF"/>
+                </a:solidFill>
+              </a14:hiddenFill>
+            </a:ext>
+          </a:extLst>
+        </p:spPr>
+      </p:pic>
+      <p:sp>
+        <p:nvSpPr>
+          <p:cNvPr id="2" name="Titel 1"/>
+          <p:cNvSpPr>
+            <a:spLocks noGrp="1"/>
+          </p:cNvSpPr>
+          <p:nvPr>
+            <p:ph type="title"/>
+          </p:nvPr>
+        </p:nvSpPr>
+        <p:spPr/>
+        <p:txBody>
+          <a:bodyPr/>
+          <a:lstStyle/>
+          <a:p>
+            <a:r>
+              <a:rPr lang="de-DE" dirty="0" smtClean="0"/>
+              <a:t>Fragen? </a:t>
+            </a:r>
+            <a:endParaRPr lang="de-DE" dirty="0"/>
+          </a:p>
+        </p:txBody>
+      </p:sp>
+      <p:sp>
+        <p:nvSpPr>
+          <p:cNvPr id="3" name="Inhaltsplatzhalter 2"/>
+          <p:cNvSpPr>
+            <a:spLocks noGrp="1"/>
+          </p:cNvSpPr>
+          <p:nvPr>
+            <p:ph idx="1"/>
+          </p:nvPr>
+        </p:nvSpPr>
+        <p:spPr>
+          <a:xfrm>
+            <a:off x="5007836" y="2160590"/>
+            <a:ext cx="4266166" cy="2701968"/>
+          </a:xfrm>
+        </p:spPr>
+        <p:txBody>
+          <a:bodyPr>
+            <a:normAutofit/>
+          </a:bodyPr>
+          <a:lstStyle/>
+          <a:p>
+            <a:r>
+              <a:rPr lang="de-DE" sz="1800" dirty="0" smtClean="0"/>
+              <a:t>Quellen (29.3.15):</a:t>
+            </a:r>
+          </a:p>
+          <a:p>
+            <a:pPr lvl="1"/>
+            <a:r>
+              <a:rPr lang="de-DE" sz="1800" dirty="0"/>
+              <a:t>www.nationale-kohorte.de</a:t>
+            </a:r>
+          </a:p>
+          <a:p>
+            <a:pPr lvl="1"/>
+            <a:r>
+              <a:rPr lang="de-DE" sz="1800" dirty="0"/>
+              <a:t>http://de.wikipedia.org/w/index.php?title=Nationale_Kohorte&amp;oldid=138423161</a:t>
+            </a:r>
+          </a:p>
+          <a:p>
+            <a:pPr lvl="1"/>
+            <a:r>
+              <a:rPr lang="de-DE" sz="1800" dirty="0"/>
+              <a:t>http://</a:t>
+            </a:r>
+            <a:r>
+              <a:rPr lang="de-DE" sz="1800" dirty="0" smtClean="0"/>
+              <a:t>www.bmbf.de/press/3480.php</a:t>
+            </a:r>
+            <a:endParaRPr lang="de-DE" sz="1800" dirty="0"/>
+          </a:p>
+        </p:txBody>
+      </p:sp>
+      <p:sp>
+        <p:nvSpPr>
+          <p:cNvPr id="4" name="Fußzeilenplatzhalter 3"/>
+          <p:cNvSpPr>
+            <a:spLocks noGrp="1"/>
+          </p:cNvSpPr>
+          <p:nvPr>
+            <p:ph type="ftr" sz="quarter" idx="11"/>
+          </p:nvPr>
+        </p:nvSpPr>
+        <p:spPr/>
+        <p:txBody>
+          <a:bodyPr/>
+          <a:lstStyle/>
+          <a:p>
+            <a:r>
+              <a:rPr lang="en-US" smtClean="0"/>
+              <a:t>| Dominik Meixner | Dominique Cheray |</a:t>
+            </a:r>
+            <a:endParaRPr lang="en-US" dirty="0"/>
+          </a:p>
+        </p:txBody>
+      </p:sp>
+    </p:spTree>
+    <p:extLst>
+      <p:ext uri="{BB962C8B-B14F-4D97-AF65-F5344CB8AC3E}">
+        <p14:creationId xmlns:p14="http://schemas.microsoft.com/office/powerpoint/2010/main" val="1827241420"/>
+      </p:ext>
+    </p:extLst>
+  </p:cSld>
+  <p:clrMapOvr>
+    <a:masterClrMapping/>
+  </p:clrMapOvr>
+</p:sld>
+</file>
+
 <file path=ppt/slides/slide3.xml><?xml version="1.0" encoding="utf-8"?>
 <p:sld xmlns:a="http://schemas.openxmlformats.org/drawingml/2006/main" xmlns:r="http://schemas.openxmlformats.org/officeDocument/2006/relationships" xmlns:p="http://schemas.openxmlformats.org/presentationml/2006/main">
   <p:cSld>
@@ -6899,6 +10263,36 @@
           </a:p>
         </p:txBody>
       </p:sp>
+      <p:pic>
+        <p:nvPicPr>
+          <p:cNvPr id="5" name="Grafik 4"/>
+          <p:cNvPicPr>
+            <a:picLocks noChangeAspect="1"/>
+          </p:cNvPicPr>
+          <p:nvPr/>
+        </p:nvPicPr>
+        <p:blipFill>
+          <a:blip r:embed="rId2">
+            <a:extLst>
+              <a:ext uri="{28A0092B-C50C-407E-A947-70E740481C1C}">
+                <a14:useLocalDpi xmlns:a14="http://schemas.microsoft.com/office/drawing/2010/main" val="0"/>
+              </a:ext>
+            </a:extLst>
+          </a:blip>
+          <a:stretch>
+            <a:fillRect/>
+          </a:stretch>
+        </p:blipFill>
+        <p:spPr>
+          <a:xfrm>
+            <a:off x="6646586" y="683663"/>
+            <a:ext cx="1838582" cy="1724266"/>
+          </a:xfrm>
+          <a:prstGeom prst="rect">
+            <a:avLst/>
+          </a:prstGeom>
+        </p:spPr>
+      </p:pic>
     </p:spTree>
     <p:extLst>
       <p:ext uri="{BB962C8B-B14F-4D97-AF65-F5344CB8AC3E}">
@@ -6976,7 +10370,17 @@
           <a:p>
             <a:r>
               <a:rPr lang="de-DE" dirty="0" smtClean="0"/>
-              <a:t>Eine groß angelegte Langzeit-Bevölkerungsstudie zur Erforschung von Volkskrankheiten, ihrer Früherkennung und Prävention</a:t>
+              <a:t>Eine groß angelegte Langzeit-Bevölkerungsstudie zur Erforschung von Volkskrankheiten, ihrer Früherkennung und </a:t>
+            </a:r>
+            <a:r>
+              <a:rPr lang="de-DE" dirty="0" smtClean="0"/>
+              <a:t>Prävention</a:t>
+            </a:r>
+          </a:p>
+          <a:p>
+            <a:r>
+              <a:rPr lang="de-DE" dirty="0" smtClean="0"/>
+              <a:t>Deutschlands größte Gesundheitsstudie</a:t>
             </a:r>
             <a:endParaRPr lang="de-DE" dirty="0"/>
           </a:p>
@@ -7107,6 +10511,36 @@
           </a:p>
         </p:txBody>
       </p:sp>
+      <p:pic>
+        <p:nvPicPr>
+          <p:cNvPr id="5" name="Grafik 4"/>
+          <p:cNvPicPr>
+            <a:picLocks noChangeAspect="1"/>
+          </p:cNvPicPr>
+          <p:nvPr/>
+        </p:nvPicPr>
+        <p:blipFill>
+          <a:blip r:embed="rId2">
+            <a:extLst>
+              <a:ext uri="{28A0092B-C50C-407E-A947-70E740481C1C}">
+                <a14:useLocalDpi xmlns:a14="http://schemas.microsoft.com/office/drawing/2010/main" val="0"/>
+              </a:ext>
+            </a:extLst>
+          </a:blip>
+          <a:stretch>
+            <a:fillRect/>
+          </a:stretch>
+        </p:blipFill>
+        <p:spPr>
+          <a:xfrm>
+            <a:off x="6706407" y="683663"/>
+            <a:ext cx="1838582" cy="1724266"/>
+          </a:xfrm>
+          <a:prstGeom prst="rect">
+            <a:avLst/>
+          </a:prstGeom>
+        </p:spPr>
+      </p:pic>
     </p:spTree>
     <p:extLst>
       <p:ext uri="{BB962C8B-B14F-4D97-AF65-F5344CB8AC3E}">
@@ -7392,6 +10826,45 @@
           <a:chExt cx="0" cy="0"/>
         </a:xfrm>
       </p:grpSpPr>
+      <p:pic>
+        <p:nvPicPr>
+          <p:cNvPr id="5" name="Grafik 4"/>
+          <p:cNvPicPr>
+            <a:picLocks noChangeAspect="1"/>
+          </p:cNvPicPr>
+          <p:nvPr/>
+        </p:nvPicPr>
+        <p:blipFill>
+          <a:blip r:embed="rId3">
+            <a:extLst>
+              <a:ext uri="{BEBA8EAE-BF5A-486C-A8C5-ECC9F3942E4B}">
+                <a14:imgProps xmlns:a14="http://schemas.microsoft.com/office/drawing/2010/main">
+                  <a14:imgLayer r:embed="rId4">
+                    <a14:imgEffect>
+                      <a14:sharpenSoften amount="50000"/>
+                    </a14:imgEffect>
+                  </a14:imgLayer>
+                </a14:imgProps>
+              </a:ext>
+              <a:ext uri="{28A0092B-C50C-407E-A947-70E740481C1C}">
+                <a14:useLocalDpi xmlns:a14="http://schemas.microsoft.com/office/drawing/2010/main" val="0"/>
+              </a:ext>
+            </a:extLst>
+          </a:blip>
+          <a:stretch>
+            <a:fillRect/>
+          </a:stretch>
+        </p:blipFill>
+        <p:spPr>
+          <a:xfrm>
+            <a:off x="6336996" y="439554"/>
+            <a:ext cx="4782218" cy="6030167"/>
+          </a:xfrm>
+          <a:prstGeom prst="rect">
+            <a:avLst/>
+          </a:prstGeom>
+        </p:spPr>
+      </p:pic>
       <p:sp>
         <p:nvSpPr>
           <p:cNvPr id="2" name="Titel 1"/>
@@ -7488,6 +10961,39 @@
               <a:t>| Dominik Meixner | Dominique Cheray |</a:t>
             </a:r>
             <a:endParaRPr lang="en-US" dirty="0"/>
+          </a:p>
+        </p:txBody>
+      </p:sp>
+      <p:sp>
+        <p:nvSpPr>
+          <p:cNvPr id="6" name="Textfeld 5"/>
+          <p:cNvSpPr txBox="1"/>
+          <p:nvPr/>
+        </p:nvSpPr>
+        <p:spPr>
+          <a:xfrm>
+            <a:off x="6336996" y="6469721"/>
+            <a:ext cx="4782218" cy="246221"/>
+          </a:xfrm>
+          <a:prstGeom prst="rect">
+            <a:avLst/>
+          </a:prstGeom>
+          <a:noFill/>
+        </p:spPr>
+        <p:txBody>
+          <a:bodyPr wrap="square" rtlCol="0">
+            <a:spAutoFit/>
+          </a:bodyPr>
+          <a:lstStyle/>
+          <a:p>
+            <a:r>
+              <a:rPr lang="de-DE" sz="1000" dirty="0" smtClean="0"/>
+              <a:t>		http</a:t>
+            </a:r>
+            <a:r>
+              <a:rPr lang="de-DE" sz="1000" dirty="0"/>
+              <a:t>://www.nationale-kohorte.de/content/nationale-kohorte.pdf</a:t>
+            </a:r>
           </a:p>
         </p:txBody>
       </p:sp>
@@ -7508,6 +11014,131 @@
       </p:par>
     </p:tnLst>
   </p:timing>
+</p:sld>
+</file>
+
+<file path=ppt/slides/slide9.xml><?xml version="1.0" encoding="utf-8"?>
+<p:sld xmlns:a="http://schemas.openxmlformats.org/drawingml/2006/main" xmlns:r="http://schemas.openxmlformats.org/officeDocument/2006/relationships" xmlns:p="http://schemas.openxmlformats.org/presentationml/2006/main">
+  <p:cSld>
+    <p:spTree>
+      <p:nvGrpSpPr>
+        <p:cNvPr id="1" name=""/>
+        <p:cNvGrpSpPr/>
+        <p:nvPr/>
+      </p:nvGrpSpPr>
+      <p:grpSpPr>
+        <a:xfrm>
+          <a:off x="0" y="0"/>
+          <a:ext cx="0" cy="0"/>
+          <a:chOff x="0" y="0"/>
+          <a:chExt cx="0" cy="0"/>
+        </a:xfrm>
+      </p:grpSpPr>
+      <p:sp>
+        <p:nvSpPr>
+          <p:cNvPr id="2" name="Titel 1"/>
+          <p:cNvSpPr>
+            <a:spLocks noGrp="1"/>
+          </p:cNvSpPr>
+          <p:nvPr>
+            <p:ph type="title"/>
+          </p:nvPr>
+        </p:nvSpPr>
+        <p:spPr/>
+        <p:txBody>
+          <a:bodyPr/>
+          <a:lstStyle/>
+          <a:p>
+            <a:r>
+              <a:rPr lang="de-DE" dirty="0" smtClean="0"/>
+              <a:t>Studienziele &amp; -aufgaben</a:t>
+            </a:r>
+            <a:endParaRPr lang="de-DE" dirty="0"/>
+          </a:p>
+        </p:txBody>
+      </p:sp>
+      <p:sp>
+        <p:nvSpPr>
+          <p:cNvPr id="3" name="Textplatzhalter 2"/>
+          <p:cNvSpPr>
+            <a:spLocks noGrp="1"/>
+          </p:cNvSpPr>
+          <p:nvPr>
+            <p:ph type="body" idx="1"/>
+          </p:nvPr>
+        </p:nvSpPr>
+        <p:spPr/>
+        <p:txBody>
+          <a:bodyPr/>
+          <a:lstStyle/>
+          <a:p>
+            <a:endParaRPr lang="de-DE"/>
+          </a:p>
+        </p:txBody>
+      </p:sp>
+      <p:sp>
+        <p:nvSpPr>
+          <p:cNvPr id="4" name="Fußzeilenplatzhalter 3"/>
+          <p:cNvSpPr>
+            <a:spLocks noGrp="1"/>
+          </p:cNvSpPr>
+          <p:nvPr>
+            <p:ph type="ftr" sz="quarter" idx="11"/>
+          </p:nvPr>
+        </p:nvSpPr>
+        <p:spPr/>
+        <p:txBody>
+          <a:bodyPr/>
+          <a:lstStyle/>
+          <a:p>
+            <a:r>
+              <a:rPr lang="en-US" smtClean="0"/>
+              <a:t>| Dominik Meixner | Dominique Cheray |</a:t>
+            </a:r>
+            <a:endParaRPr lang="en-US" dirty="0"/>
+          </a:p>
+        </p:txBody>
+      </p:sp>
+      <p:pic>
+        <p:nvPicPr>
+          <p:cNvPr id="5" name="Grafik 4"/>
+          <p:cNvPicPr>
+            <a:picLocks noChangeAspect="1"/>
+          </p:cNvPicPr>
+          <p:nvPr/>
+        </p:nvPicPr>
+        <p:blipFill>
+          <a:blip r:embed="rId2">
+            <a:extLst>
+              <a:ext uri="{28A0092B-C50C-407E-A947-70E740481C1C}">
+                <a14:useLocalDpi xmlns:a14="http://schemas.microsoft.com/office/drawing/2010/main" val="0"/>
+              </a:ext>
+            </a:extLst>
+          </a:blip>
+          <a:stretch>
+            <a:fillRect/>
+          </a:stretch>
+        </p:blipFill>
+        <p:spPr>
+          <a:xfrm>
+            <a:off x="6646586" y="683663"/>
+            <a:ext cx="1838582" cy="1724266"/>
+          </a:xfrm>
+          <a:prstGeom prst="rect">
+            <a:avLst/>
+          </a:prstGeom>
+        </p:spPr>
+      </p:pic>
+    </p:spTree>
+    <p:extLst>
+      <p:ext uri="{BB962C8B-B14F-4D97-AF65-F5344CB8AC3E}">
+        <p14:creationId xmlns:p14="http://schemas.microsoft.com/office/powerpoint/2010/main" val="852178695"/>
+      </p:ext>
+    </p:extLst>
+  </p:cSld>
+  <p:clrMapOvr>
+    <a:masterClrMapping/>
+  </p:clrMapOvr>
 </p:sld>
 </file>
 

</xml_diff>

<commit_message>
Tippfehler in NaKo behoben
Ich hatte doch tatsächlich Datenschutzbestimmung mit 3 m geschrieben.
Shame on me.
</commit_message>
<xml_diff>
--- a/NationaleKohorte/NationaleKohortePraes.pptx
+++ b/NationaleKohorte/NationaleKohortePraes.pptx
@@ -131,7 +131,7 @@
   </p:defaultTextStyle>
   <p:extLst>
     <p:ext uri="{EFAFB233-063F-42B5-8137-9DF3F51BA10A}">
-      <p15:sldGuideLst xmlns="" xmlns:p15="http://schemas.microsoft.com/office/powerpoint/2012/main"/>
+      <p15:sldGuideLst xmlns:p15="http://schemas.microsoft.com/office/powerpoint/2012/main" xmlns=""/>
     </p:ext>
   </p:extLst>
 </p:presentation>
@@ -225,7 +225,7 @@
           <a:p>
             <a:fld id="{FD0E5214-A780-45B3-8C91-E131831524A4}" type="datetimeFigureOut">
               <a:rPr lang="de-DE" smtClean="0"/>
-              <a:t>29.03.2015</a:t>
+              <a:t>02.04.2015</a:t>
             </a:fld>
             <a:endParaRPr lang="de-DE"/>
           </a:p>
@@ -3176,7 +3176,7 @@
           <a:p>
             <a:fld id="{430DCDF4-4212-41DE-881A-86CC5F4C4960}" type="datetime1">
               <a:rPr lang="en-US" smtClean="0"/>
-              <a:t>3/29/2015</a:t>
+              <a:t>4/2/2015</a:t>
             </a:fld>
             <a:endParaRPr lang="en-US" dirty="0"/>
           </a:p>
@@ -3455,7 +3455,7 @@
           <a:p>
             <a:fld id="{7D7F22C2-E00C-402C-9237-97B2DDDB1C1E}" type="datetime1">
               <a:rPr lang="en-US" smtClean="0"/>
-              <a:t>3/29/2015</a:t>
+              <a:t>4/2/2015</a:t>
             </a:fld>
             <a:endParaRPr lang="en-US" dirty="0"/>
           </a:p>
@@ -3750,7 +3750,7 @@
           <a:p>
             <a:fld id="{4751C775-F499-41CA-BB69-5F0CE1DC728B}" type="datetime1">
               <a:rPr lang="en-US" smtClean="0"/>
-              <a:t>3/29/2015</a:t>
+              <a:t>4/2/2015</a:t>
             </a:fld>
             <a:endParaRPr lang="en-US" dirty="0"/>
           </a:p>
@@ -4072,7 +4072,7 @@
           <a:p>
             <a:fld id="{EF0B729F-5E1E-40E7-8D1F-2FBC0AA7C9CD}" type="datetime1">
               <a:rPr lang="en-US" smtClean="0"/>
-              <a:t>3/29/2015</a:t>
+              <a:t>4/2/2015</a:t>
             </a:fld>
             <a:endParaRPr lang="en-US" dirty="0"/>
           </a:p>
@@ -4367,7 +4367,7 @@
           <a:p>
             <a:fld id="{6C610283-F1E1-40D0-ACF0-C635052CA35C}" type="datetime1">
               <a:rPr lang="en-US" smtClean="0"/>
-              <a:t>3/29/2015</a:t>
+              <a:t>4/2/2015</a:t>
             </a:fld>
             <a:endParaRPr lang="en-US" dirty="0"/>
           </a:p>
@@ -4741,7 +4741,7 @@
           <a:p>
             <a:fld id="{DDCC8832-2E28-430A-AD8F-583F9F33222D}" type="datetime1">
               <a:rPr lang="en-US" smtClean="0"/>
-              <a:t>3/29/2015</a:t>
+              <a:t>4/2/2015</a:t>
             </a:fld>
             <a:endParaRPr lang="en-US" dirty="0"/>
           </a:p>
@@ -4899,7 +4899,7 @@
           <a:p>
             <a:fld id="{76E487D9-92EA-4374-B9A8-0C938596B06B}" type="datetime1">
               <a:rPr lang="en-US" smtClean="0"/>
-              <a:t>3/29/2015</a:t>
+              <a:t>4/2/2015</a:t>
             </a:fld>
             <a:endParaRPr lang="en-US" dirty="0"/>
           </a:p>
@@ -5060,7 +5060,7 @@
           <a:p>
             <a:fld id="{03B2E87A-4C56-4FB1-83A8-C433C44AFBA9}" type="datetime1">
               <a:rPr lang="en-US" smtClean="0"/>
-              <a:t>3/29/2015</a:t>
+              <a:t>4/2/2015</a:t>
             </a:fld>
             <a:endParaRPr lang="en-US" dirty="0"/>
           </a:p>
@@ -5240,7 +5240,7 @@
           <a:p>
             <a:fld id="{A5828E15-EAE5-4696-A498-9462A8D07DB3}" type="datetime1">
               <a:rPr lang="en-US" smtClean="0"/>
-              <a:t>3/29/2015</a:t>
+              <a:t>4/2/2015</a:t>
             </a:fld>
             <a:endParaRPr lang="en-US" dirty="0"/>
           </a:p>
@@ -5482,7 +5482,7 @@
           <a:p>
             <a:fld id="{30C89575-A7F9-45D9-8DD0-EEE9ED1F7FA0}" type="datetime1">
               <a:rPr lang="en-US" smtClean="0"/>
-              <a:t>3/29/2015</a:t>
+              <a:t>4/2/2015</a:t>
             </a:fld>
             <a:endParaRPr lang="en-US" dirty="0"/>
           </a:p>
@@ -5702,7 +5702,7 @@
           <a:p>
             <a:fld id="{7A131F54-E68E-47BE-8946-F526F364CBA6}" type="datetime1">
               <a:rPr lang="en-US" smtClean="0"/>
-              <a:t>3/29/2015</a:t>
+              <a:t>4/2/2015</a:t>
             </a:fld>
             <a:endParaRPr lang="en-US" dirty="0"/>
           </a:p>
@@ -6057,7 +6057,7 @@
           <a:p>
             <a:fld id="{54938A4C-ABDD-4D7F-9EE8-D2212DFA111A}" type="datetime1">
               <a:rPr lang="en-US" smtClean="0"/>
-              <a:t>3/29/2015</a:t>
+              <a:t>4/2/2015</a:t>
             </a:fld>
             <a:endParaRPr lang="en-US" dirty="0"/>
           </a:p>
@@ -6161,7 +6161,7 @@
           <a:p>
             <a:fld id="{472087FD-69A5-4863-93C8-147616460B5F}" type="datetime1">
               <a:rPr lang="en-US" smtClean="0"/>
-              <a:t>3/29/2015</a:t>
+              <a:t>4/2/2015</a:t>
             </a:fld>
             <a:endParaRPr lang="en-US" dirty="0"/>
           </a:p>
@@ -6237,7 +6237,7 @@
           <a:p>
             <a:fld id="{DE67AA65-3958-4B15-93E3-62DB88057388}" type="datetime1">
               <a:rPr lang="en-US" smtClean="0"/>
-              <a:t>3/29/2015</a:t>
+              <a:t>4/2/2015</a:t>
             </a:fld>
             <a:endParaRPr lang="en-US" dirty="0"/>
           </a:p>
@@ -6473,7 +6473,7 @@
           <a:p>
             <a:fld id="{3A3AF593-EE7A-4564-A95B-6C86BAEF9839}" type="datetime1">
               <a:rPr lang="en-US" smtClean="0"/>
-              <a:t>3/29/2015</a:t>
+              <a:t>4/2/2015</a:t>
             </a:fld>
             <a:endParaRPr lang="en-US" dirty="0"/>
           </a:p>
@@ -6717,7 +6717,7 @@
           <a:p>
             <a:fld id="{D226D4E0-B61D-4B17-878D-83CEB6B35F48}" type="datetime1">
               <a:rPr lang="en-US" smtClean="0"/>
-              <a:t>3/29/2015</a:t>
+              <a:t>4/2/2015</a:t>
             </a:fld>
             <a:endParaRPr lang="en-US" dirty="0"/>
           </a:p>
@@ -7441,7 +7441,7 @@
           <a:p>
             <a:fld id="{FA7EC809-ED1F-4983-9906-520EA3F002C5}" type="datetime1">
               <a:rPr lang="en-US" smtClean="0"/>
-              <a:t>3/29/2015</a:t>
+              <a:t>4/2/2015</a:t>
             </a:fld>
             <a:endParaRPr lang="en-US" dirty="0"/>
           </a:p>
@@ -8121,7 +8121,7 @@
           <a:p>
             <a:fld id="{B68A97D9-23A2-4961-BD27-93DAEBE0E1E1}" type="datetime2">
               <a:rPr lang="de-DE" smtClean="0"/>
-              <a:t>Sonntag, 29. März 2015</a:t>
+              <a:t>Donnerstag, 2. April 2015</a:t>
             </a:fld>
             <a:endParaRPr lang="de-DE" dirty="0"/>
           </a:p>
@@ -8413,14 +8413,14 @@
           <a:p>
             <a:pPr lvl="0"/>
             <a:r>
-              <a:rPr lang="de-DE"/>
+              <a:rPr lang="de-DE" dirty="0"/>
               <a:t>Evaluation von Markern als effektive Hilfsmittel zur Früherkennung von chronischen </a:t>
             </a:r>
             <a:r>
-              <a:rPr lang="de-DE" smtClean="0"/>
+              <a:rPr lang="de-DE" dirty="0" smtClean="0"/>
               <a:t>Krankheiten</a:t>
             </a:r>
-            <a:endParaRPr lang="de-DE"/>
+            <a:endParaRPr lang="de-DE" dirty="0"/>
           </a:p>
         </p:txBody>
       </p:sp>
@@ -9799,12 +9799,12 @@
               <a:t>Rechtliche Aspekte – </a:t>
             </a:r>
             <a:r>
-              <a:rPr lang="de-DE" dirty="0" err="1" smtClean="0"/>
-              <a:t>Datenschutzbestimmmungen</a:t>
-            </a:r>
-            <a:r>
               <a:rPr lang="de-DE" dirty="0" smtClean="0"/>
-              <a:t> und IT- Sicherheit</a:t>
+              <a:t>Datenschutzbestimmungen </a:t>
+            </a:r>
+            <a:r>
+              <a:rPr lang="de-DE" dirty="0" smtClean="0"/>
+              <a:t>und IT- Sicherheit</a:t>
             </a:r>
             <a:endParaRPr lang="de-DE" dirty="0"/>
           </a:p>
@@ -9868,7 +9868,6 @@
               <a:rPr lang="de-DE" dirty="0"/>
               <a:t>Verwendung der Daten ausschließlich zu wissenschaftlichen Zwecken </a:t>
             </a:r>
-            <a:endParaRPr lang="de-DE" dirty="0"/>
           </a:p>
         </p:txBody>
       </p:sp>
@@ -10370,11 +10369,7 @@
           <a:p>
             <a:r>
               <a:rPr lang="de-DE" dirty="0" smtClean="0"/>
-              <a:t>Eine groß angelegte Langzeit-Bevölkerungsstudie zur Erforschung von Volkskrankheiten, ihrer Früherkennung und </a:t>
-            </a:r>
-            <a:r>
-              <a:rPr lang="de-DE" dirty="0" smtClean="0"/>
-              <a:t>Prävention</a:t>
+              <a:t>Eine groß angelegte Langzeit-Bevölkerungsstudie zur Erforschung von Volkskrankheiten, ihrer Früherkennung und Prävention</a:t>
             </a:r>
           </a:p>
           <a:p>
@@ -11333,7 +11328,7 @@
   <a:extraClrSchemeLst/>
   <a:extLst>
     <a:ext uri="{05A4C25C-085E-4340-85A3-A5531E510DB2}">
-      <thm15:themeFamily xmlns="" xmlns:thm15="http://schemas.microsoft.com/office/thememl/2012/main" name="Facet" id="{C0C680CD-088A-49FC-A102-D699147F32B2}" vid="{CFBC31BA-B70F-4F30-BCAA-4F3011E16C4D}"/>
+      <thm15:themeFamily xmlns:thm15="http://schemas.microsoft.com/office/thememl/2012/main" xmlns="" name="Facet" id="{C0C680CD-088A-49FC-A102-D699147F32B2}" vid="{CFBC31BA-B70F-4F30-BCAA-4F3011E16C4D}"/>
     </a:ext>
   </a:extLst>
 </a:theme>
@@ -11594,7 +11589,7 @@
   <a:extraClrSchemeLst/>
   <a:extLst>
     <a:ext uri="{05A4C25C-085E-4340-85A3-A5531E510DB2}">
-      <thm15:themeFamily xmlns="" xmlns:thm15="http://schemas.microsoft.com/office/thememl/2012/main" name="Office Theme" id="{62F939B6-93AF-4DB8-9C6B-D6C7DFDC589F}" vid="{4A3C46E8-61CC-4603-A589-7422A47A8E4A}"/>
+      <thm15:themeFamily xmlns:thm15="http://schemas.microsoft.com/office/thememl/2012/main" xmlns="" name="Office Theme" id="{62F939B6-93AF-4DB8-9C6B-D6C7DFDC589F}" vid="{4A3C46E8-61CC-4603-A589-7422A47A8E4A}"/>
     </a:ext>
   </a:extLst>
 </a:theme>

</xml_diff>